<commit_message>
added slides about LDA and topic models
</commit_message>
<xml_diff>
--- a/HW4/DBN-v2.pptx
+++ b/HW4/DBN-v2.pptx
@@ -4,20 +4,23 @@
   <p:sldMasterIdLst>
     <p:sldMasterId id="2147483672" r:id="rId1"/>
   </p:sldMasterIdLst>
+  <p:notesMasterIdLst>
+    <p:notesMasterId r:id="rId16"/>
+  </p:notesMasterIdLst>
   <p:sldIdLst>
     <p:sldId id="256" r:id="rId2"/>
     <p:sldId id="257" r:id="rId3"/>
-    <p:sldId id="270" r:id="rId4"/>
-    <p:sldId id="269" r:id="rId5"/>
-    <p:sldId id="258" r:id="rId6"/>
-    <p:sldId id="260" r:id="rId7"/>
-    <p:sldId id="268" r:id="rId8"/>
-    <p:sldId id="262" r:id="rId9"/>
-    <p:sldId id="263" r:id="rId10"/>
-    <p:sldId id="264" r:id="rId11"/>
-    <p:sldId id="265" r:id="rId12"/>
-    <p:sldId id="272" r:id="rId13"/>
-    <p:sldId id="266" r:id="rId14"/>
+    <p:sldId id="274" r:id="rId4"/>
+    <p:sldId id="273" r:id="rId5"/>
+    <p:sldId id="269" r:id="rId6"/>
+    <p:sldId id="258" r:id="rId7"/>
+    <p:sldId id="260" r:id="rId8"/>
+    <p:sldId id="268" r:id="rId9"/>
+    <p:sldId id="262" r:id="rId10"/>
+    <p:sldId id="263" r:id="rId11"/>
+    <p:sldId id="264" r:id="rId12"/>
+    <p:sldId id="265" r:id="rId13"/>
+    <p:sldId id="272" r:id="rId14"/>
     <p:sldId id="271" r:id="rId15"/>
   </p:sldIdLst>
   <p:sldSz cx="12192000" cy="6858000"/>
@@ -425,11 +428,11 @@
           <c:showBubbleSize val="0"/>
         </c:dLbls>
         <c:smooth val="0"/>
-        <c:axId val="268827640"/>
-        <c:axId val="268830776"/>
+        <c:axId val="240396960"/>
+        <c:axId val="240396176"/>
       </c:lineChart>
       <c:catAx>
-        <c:axId val="268827640"/>
+        <c:axId val="240396960"/>
         <c:scaling>
           <c:orientation val="minMax"/>
         </c:scaling>
@@ -529,7 +532,7 @@
             <a:endParaRPr lang="en-US"/>
           </a:p>
         </c:txPr>
-        <c:crossAx val="268830776"/>
+        <c:crossAx val="240396176"/>
         <c:crosses val="autoZero"/>
         <c:auto val="1"/>
         <c:lblAlgn val="ctr"/>
@@ -537,7 +540,7 @@
         <c:noMultiLvlLbl val="0"/>
       </c:catAx>
       <c:valAx>
-        <c:axId val="268830776"/>
+        <c:axId val="240396176"/>
         <c:scaling>
           <c:orientation val="minMax"/>
         </c:scaling>
@@ -649,7 +652,7 @@
             <a:endParaRPr lang="en-US"/>
           </a:p>
         </c:txPr>
-        <c:crossAx val="268827640"/>
+        <c:crossAx val="240396960"/>
         <c:crosses val="autoZero"/>
         <c:crossBetween val="between"/>
       </c:valAx>
@@ -765,19 +768,7 @@
               <a:rPr lang="en-US" sz="1800" b="0" i="0" baseline="0" dirty="0" smtClean="0">
                 <a:effectLst/>
               </a:rPr>
-              <a:t>Accuracy of Classifying </a:t>
-            </a:r>
-            <a:r>
-              <a:rPr lang="en-US" sz="1800" b="0" i="0" baseline="0" dirty="0" err="1" smtClean="0">
-                <a:effectLst/>
-              </a:rPr>
-              <a:t>Shakespear</a:t>
-            </a:r>
-            <a:r>
-              <a:rPr lang="en-US" sz="1800" b="0" i="0" baseline="0" dirty="0" smtClean="0">
-                <a:effectLst/>
-              </a:rPr>
-              <a:t> Plays DBN vs RF</a:t>
+              <a:t>Accuracy of Classifying Shakespeare Plays DBN vs RF</a:t>
             </a:r>
             <a:endParaRPr lang="en-US" dirty="0">
               <a:effectLst/>
@@ -1076,11 +1067,11 @@
           <c:showBubbleSize val="0"/>
         </c:dLbls>
         <c:smooth val="0"/>
-        <c:axId val="400578104"/>
-        <c:axId val="400580064"/>
+        <c:axId val="317059520"/>
+        <c:axId val="317062656"/>
       </c:lineChart>
       <c:catAx>
-        <c:axId val="400578104"/>
+        <c:axId val="317059520"/>
         <c:scaling>
           <c:orientation val="minMax"/>
         </c:scaling>
@@ -1180,7 +1171,7 @@
             <a:endParaRPr lang="en-US"/>
           </a:p>
         </c:txPr>
-        <c:crossAx val="400580064"/>
+        <c:crossAx val="317062656"/>
         <c:crosses val="autoZero"/>
         <c:auto val="1"/>
         <c:lblAlgn val="ctr"/>
@@ -1188,7 +1179,7 @@
         <c:noMultiLvlLbl val="0"/>
       </c:catAx>
       <c:valAx>
-        <c:axId val="400580064"/>
+        <c:axId val="317062656"/>
         <c:scaling>
           <c:orientation val="minMax"/>
         </c:scaling>
@@ -1300,7 +1291,7 @@
             <a:endParaRPr lang="en-US"/>
           </a:p>
         </c:txPr>
-        <c:crossAx val="400578104"/>
+        <c:crossAx val="317059520"/>
         <c:crosses val="autoZero"/>
         <c:crossBetween val="between"/>
       </c:valAx>
@@ -2483,6 +2474,642 @@
 </cs:chartStyle>
 </file>
 
+<file path=ppt/notesMasters/notesMaster1.xml><?xml version="1.0" encoding="utf-8"?>
+<p:notesMaster xmlns:a="http://schemas.openxmlformats.org/drawingml/2006/main" xmlns:r="http://schemas.openxmlformats.org/officeDocument/2006/relationships" xmlns:p="http://schemas.openxmlformats.org/presentationml/2006/main">
+  <p:cSld>
+    <p:bg>
+      <p:bgRef idx="1001">
+        <a:schemeClr val="bg1"/>
+      </p:bgRef>
+    </p:bg>
+    <p:spTree>
+      <p:nvGrpSpPr>
+        <p:cNvPr id="1" name=""/>
+        <p:cNvGrpSpPr/>
+        <p:nvPr/>
+      </p:nvGrpSpPr>
+      <p:grpSpPr>
+        <a:xfrm>
+          <a:off x="0" y="0"/>
+          <a:ext cx="0" cy="0"/>
+          <a:chOff x="0" y="0"/>
+          <a:chExt cx="0" cy="0"/>
+        </a:xfrm>
+      </p:grpSpPr>
+      <p:sp>
+        <p:nvSpPr>
+          <p:cNvPr id="2" name="Header Placeholder 1"/>
+          <p:cNvSpPr>
+            <a:spLocks noGrp="1"/>
+          </p:cNvSpPr>
+          <p:nvPr>
+            <p:ph type="hdr" sz="quarter"/>
+          </p:nvPr>
+        </p:nvSpPr>
+        <p:spPr>
+          <a:xfrm>
+            <a:off x="0" y="0"/>
+            <a:ext cx="2971800" cy="458788"/>
+          </a:xfrm>
+          <a:prstGeom prst="rect">
+            <a:avLst/>
+          </a:prstGeom>
+        </p:spPr>
+        <p:txBody>
+          <a:bodyPr vert="horz" lIns="91440" tIns="45720" rIns="91440" bIns="45720" rtlCol="0"/>
+          <a:lstStyle>
+            <a:lvl1pPr algn="l">
+              <a:defRPr sz="1200"/>
+            </a:lvl1pPr>
+          </a:lstStyle>
+          <a:p>
+            <a:endParaRPr lang="en-US"/>
+          </a:p>
+        </p:txBody>
+      </p:sp>
+      <p:sp>
+        <p:nvSpPr>
+          <p:cNvPr id="3" name="Date Placeholder 2"/>
+          <p:cNvSpPr>
+            <a:spLocks noGrp="1"/>
+          </p:cNvSpPr>
+          <p:nvPr>
+            <p:ph type="dt" idx="1"/>
+          </p:nvPr>
+        </p:nvSpPr>
+        <p:spPr>
+          <a:xfrm>
+            <a:off x="3884613" y="0"/>
+            <a:ext cx="2971800" cy="458788"/>
+          </a:xfrm>
+          <a:prstGeom prst="rect">
+            <a:avLst/>
+          </a:prstGeom>
+        </p:spPr>
+        <p:txBody>
+          <a:bodyPr vert="horz" lIns="91440" tIns="45720" rIns="91440" bIns="45720" rtlCol="0"/>
+          <a:lstStyle>
+            <a:lvl1pPr algn="r">
+              <a:defRPr sz="1200"/>
+            </a:lvl1pPr>
+          </a:lstStyle>
+          <a:p>
+            <a:fld id="{1353E0B1-5AB5-4489-9F9F-F2C4B35E84FA}" type="datetimeFigureOut">
+              <a:rPr lang="en-US" smtClean="0"/>
+              <a:t>10/20/2015</a:t>
+            </a:fld>
+            <a:endParaRPr lang="en-US"/>
+          </a:p>
+        </p:txBody>
+      </p:sp>
+      <p:sp>
+        <p:nvSpPr>
+          <p:cNvPr id="4" name="Slide Image Placeholder 3"/>
+          <p:cNvSpPr>
+            <a:spLocks noGrp="1" noRot="1" noChangeAspect="1"/>
+          </p:cNvSpPr>
+          <p:nvPr>
+            <p:ph type="sldImg" idx="2"/>
+          </p:nvPr>
+        </p:nvSpPr>
+        <p:spPr>
+          <a:xfrm>
+            <a:off x="685800" y="1143000"/>
+            <a:ext cx="5486400" cy="3086100"/>
+          </a:xfrm>
+          <a:prstGeom prst="rect">
+            <a:avLst/>
+          </a:prstGeom>
+          <a:noFill/>
+          <a:ln w="12700">
+            <a:solidFill>
+              <a:prstClr val="black"/>
+            </a:solidFill>
+          </a:ln>
+        </p:spPr>
+        <p:txBody>
+          <a:bodyPr vert="horz" lIns="91440" tIns="45720" rIns="91440" bIns="45720" rtlCol="0" anchor="ctr"/>
+          <a:lstStyle/>
+          <a:p>
+            <a:endParaRPr lang="en-US"/>
+          </a:p>
+        </p:txBody>
+      </p:sp>
+      <p:sp>
+        <p:nvSpPr>
+          <p:cNvPr id="5" name="Notes Placeholder 4"/>
+          <p:cNvSpPr>
+            <a:spLocks noGrp="1"/>
+          </p:cNvSpPr>
+          <p:nvPr>
+            <p:ph type="body" sz="quarter" idx="3"/>
+          </p:nvPr>
+        </p:nvSpPr>
+        <p:spPr>
+          <a:xfrm>
+            <a:off x="685800" y="4400550"/>
+            <a:ext cx="5486400" cy="3600450"/>
+          </a:xfrm>
+          <a:prstGeom prst="rect">
+            <a:avLst/>
+          </a:prstGeom>
+        </p:spPr>
+        <p:txBody>
+          <a:bodyPr vert="horz" lIns="91440" tIns="45720" rIns="91440" bIns="45720" rtlCol="0"/>
+          <a:lstStyle/>
+          <a:p>
+            <a:pPr lvl="0"/>
+            <a:r>
+              <a:rPr lang="en-US" smtClean="0"/>
+              <a:t>Click to edit Master text styles</a:t>
+            </a:r>
+          </a:p>
+          <a:p>
+            <a:pPr lvl="1"/>
+            <a:r>
+              <a:rPr lang="en-US" smtClean="0"/>
+              <a:t>Second level</a:t>
+            </a:r>
+          </a:p>
+          <a:p>
+            <a:pPr lvl="2"/>
+            <a:r>
+              <a:rPr lang="en-US" smtClean="0"/>
+              <a:t>Third level</a:t>
+            </a:r>
+          </a:p>
+          <a:p>
+            <a:pPr lvl="3"/>
+            <a:r>
+              <a:rPr lang="en-US" smtClean="0"/>
+              <a:t>Fourth level</a:t>
+            </a:r>
+          </a:p>
+          <a:p>
+            <a:pPr lvl="4"/>
+            <a:r>
+              <a:rPr lang="en-US" smtClean="0"/>
+              <a:t>Fifth level</a:t>
+            </a:r>
+            <a:endParaRPr lang="en-US"/>
+          </a:p>
+        </p:txBody>
+      </p:sp>
+      <p:sp>
+        <p:nvSpPr>
+          <p:cNvPr id="6" name="Footer Placeholder 5"/>
+          <p:cNvSpPr>
+            <a:spLocks noGrp="1"/>
+          </p:cNvSpPr>
+          <p:nvPr>
+            <p:ph type="ftr" sz="quarter" idx="4"/>
+          </p:nvPr>
+        </p:nvSpPr>
+        <p:spPr>
+          <a:xfrm>
+            <a:off x="0" y="8685213"/>
+            <a:ext cx="2971800" cy="458787"/>
+          </a:xfrm>
+          <a:prstGeom prst="rect">
+            <a:avLst/>
+          </a:prstGeom>
+        </p:spPr>
+        <p:txBody>
+          <a:bodyPr vert="horz" lIns="91440" tIns="45720" rIns="91440" bIns="45720" rtlCol="0" anchor="b"/>
+          <a:lstStyle>
+            <a:lvl1pPr algn="l">
+              <a:defRPr sz="1200"/>
+            </a:lvl1pPr>
+          </a:lstStyle>
+          <a:p>
+            <a:endParaRPr lang="en-US"/>
+          </a:p>
+        </p:txBody>
+      </p:sp>
+      <p:sp>
+        <p:nvSpPr>
+          <p:cNvPr id="7" name="Slide Number Placeholder 6"/>
+          <p:cNvSpPr>
+            <a:spLocks noGrp="1"/>
+          </p:cNvSpPr>
+          <p:nvPr>
+            <p:ph type="sldNum" sz="quarter" idx="5"/>
+          </p:nvPr>
+        </p:nvSpPr>
+        <p:spPr>
+          <a:xfrm>
+            <a:off x="3884613" y="8685213"/>
+            <a:ext cx="2971800" cy="458787"/>
+          </a:xfrm>
+          <a:prstGeom prst="rect">
+            <a:avLst/>
+          </a:prstGeom>
+        </p:spPr>
+        <p:txBody>
+          <a:bodyPr vert="horz" lIns="91440" tIns="45720" rIns="91440" bIns="45720" rtlCol="0" anchor="b"/>
+          <a:lstStyle>
+            <a:lvl1pPr algn="r">
+              <a:defRPr sz="1200"/>
+            </a:lvl1pPr>
+          </a:lstStyle>
+          <a:p>
+            <a:fld id="{CA184533-7BC9-4CE8-BD5E-7F40AAB3FD78}" type="slidenum">
+              <a:rPr lang="en-US" smtClean="0"/>
+              <a:t>‹#›</a:t>
+            </a:fld>
+            <a:endParaRPr lang="en-US"/>
+          </a:p>
+        </p:txBody>
+      </p:sp>
+    </p:spTree>
+    <p:extLst>
+      <p:ext uri="{BB962C8B-B14F-4D97-AF65-F5344CB8AC3E}">
+        <p14:creationId xmlns:p14="http://schemas.microsoft.com/office/powerpoint/2010/main" val="2730528359"/>
+      </p:ext>
+    </p:extLst>
+  </p:cSld>
+  <p:clrMap bg1="lt1" tx1="dk1" bg2="lt2" tx2="dk2" accent1="accent1" accent2="accent2" accent3="accent3" accent4="accent4" accent5="accent5" accent6="accent6" hlink="hlink" folHlink="folHlink"/>
+  <p:notesStyle>
+    <a:lvl1pPr marL="0" algn="l" defTabSz="914400" rtl="0" eaLnBrk="1" latinLnBrk="0" hangingPunct="1">
+      <a:defRPr sz="1200" kern="1200">
+        <a:solidFill>
+          <a:schemeClr val="tx1"/>
+        </a:solidFill>
+        <a:latin typeface="+mn-lt"/>
+        <a:ea typeface="+mn-ea"/>
+        <a:cs typeface="+mn-cs"/>
+      </a:defRPr>
+    </a:lvl1pPr>
+    <a:lvl2pPr marL="457200" algn="l" defTabSz="914400" rtl="0" eaLnBrk="1" latinLnBrk="0" hangingPunct="1">
+      <a:defRPr sz="1200" kern="1200">
+        <a:solidFill>
+          <a:schemeClr val="tx1"/>
+        </a:solidFill>
+        <a:latin typeface="+mn-lt"/>
+        <a:ea typeface="+mn-ea"/>
+        <a:cs typeface="+mn-cs"/>
+      </a:defRPr>
+    </a:lvl2pPr>
+    <a:lvl3pPr marL="914400" algn="l" defTabSz="914400" rtl="0" eaLnBrk="1" latinLnBrk="0" hangingPunct="1">
+      <a:defRPr sz="1200" kern="1200">
+        <a:solidFill>
+          <a:schemeClr val="tx1"/>
+        </a:solidFill>
+        <a:latin typeface="+mn-lt"/>
+        <a:ea typeface="+mn-ea"/>
+        <a:cs typeface="+mn-cs"/>
+      </a:defRPr>
+    </a:lvl3pPr>
+    <a:lvl4pPr marL="1371600" algn="l" defTabSz="914400" rtl="0" eaLnBrk="1" latinLnBrk="0" hangingPunct="1">
+      <a:defRPr sz="1200" kern="1200">
+        <a:solidFill>
+          <a:schemeClr val="tx1"/>
+        </a:solidFill>
+        <a:latin typeface="+mn-lt"/>
+        <a:ea typeface="+mn-ea"/>
+        <a:cs typeface="+mn-cs"/>
+      </a:defRPr>
+    </a:lvl4pPr>
+    <a:lvl5pPr marL="1828800" algn="l" defTabSz="914400" rtl="0" eaLnBrk="1" latinLnBrk="0" hangingPunct="1">
+      <a:defRPr sz="1200" kern="1200">
+        <a:solidFill>
+          <a:schemeClr val="tx1"/>
+        </a:solidFill>
+        <a:latin typeface="+mn-lt"/>
+        <a:ea typeface="+mn-ea"/>
+        <a:cs typeface="+mn-cs"/>
+      </a:defRPr>
+    </a:lvl5pPr>
+    <a:lvl6pPr marL="2286000" algn="l" defTabSz="914400" rtl="0" eaLnBrk="1" latinLnBrk="0" hangingPunct="1">
+      <a:defRPr sz="1200" kern="1200">
+        <a:solidFill>
+          <a:schemeClr val="tx1"/>
+        </a:solidFill>
+        <a:latin typeface="+mn-lt"/>
+        <a:ea typeface="+mn-ea"/>
+        <a:cs typeface="+mn-cs"/>
+      </a:defRPr>
+    </a:lvl6pPr>
+    <a:lvl7pPr marL="2743200" algn="l" defTabSz="914400" rtl="0" eaLnBrk="1" latinLnBrk="0" hangingPunct="1">
+      <a:defRPr sz="1200" kern="1200">
+        <a:solidFill>
+          <a:schemeClr val="tx1"/>
+        </a:solidFill>
+        <a:latin typeface="+mn-lt"/>
+        <a:ea typeface="+mn-ea"/>
+        <a:cs typeface="+mn-cs"/>
+      </a:defRPr>
+    </a:lvl7pPr>
+    <a:lvl8pPr marL="3200400" algn="l" defTabSz="914400" rtl="0" eaLnBrk="1" latinLnBrk="0" hangingPunct="1">
+      <a:defRPr sz="1200" kern="1200">
+        <a:solidFill>
+          <a:schemeClr val="tx1"/>
+        </a:solidFill>
+        <a:latin typeface="+mn-lt"/>
+        <a:ea typeface="+mn-ea"/>
+        <a:cs typeface="+mn-cs"/>
+      </a:defRPr>
+    </a:lvl8pPr>
+    <a:lvl9pPr marL="3657600" algn="l" defTabSz="914400" rtl="0" eaLnBrk="1" latinLnBrk="0" hangingPunct="1">
+      <a:defRPr sz="1200" kern="1200">
+        <a:solidFill>
+          <a:schemeClr val="tx1"/>
+        </a:solidFill>
+        <a:latin typeface="+mn-lt"/>
+        <a:ea typeface="+mn-ea"/>
+        <a:cs typeface="+mn-cs"/>
+      </a:defRPr>
+    </a:lvl9pPr>
+  </p:notesStyle>
+</p:notesMaster>
+</file>
+
+<file path=ppt/notesSlides/notesSlide1.xml><?xml version="1.0" encoding="utf-8"?>
+<p:notes xmlns:a="http://schemas.openxmlformats.org/drawingml/2006/main" xmlns:r="http://schemas.openxmlformats.org/officeDocument/2006/relationships" xmlns:p="http://schemas.openxmlformats.org/presentationml/2006/main">
+  <p:cSld>
+    <p:spTree>
+      <p:nvGrpSpPr>
+        <p:cNvPr id="1" name=""/>
+        <p:cNvGrpSpPr/>
+        <p:nvPr/>
+      </p:nvGrpSpPr>
+      <p:grpSpPr>
+        <a:xfrm>
+          <a:off x="0" y="0"/>
+          <a:ext cx="0" cy="0"/>
+          <a:chOff x="0" y="0"/>
+          <a:chExt cx="0" cy="0"/>
+        </a:xfrm>
+      </p:grpSpPr>
+      <p:sp>
+        <p:nvSpPr>
+          <p:cNvPr id="2" name="Slide Image Placeholder 1"/>
+          <p:cNvSpPr>
+            <a:spLocks noGrp="1" noRot="1" noChangeAspect="1"/>
+          </p:cNvSpPr>
+          <p:nvPr>
+            <p:ph type="sldImg"/>
+          </p:nvPr>
+        </p:nvSpPr>
+        <p:spPr/>
+      </p:sp>
+      <p:sp>
+        <p:nvSpPr>
+          <p:cNvPr id="3" name="Notes Placeholder 2"/>
+          <p:cNvSpPr>
+            <a:spLocks noGrp="1"/>
+          </p:cNvSpPr>
+          <p:nvPr>
+            <p:ph type="body" idx="1"/>
+          </p:nvPr>
+        </p:nvSpPr>
+        <p:spPr/>
+        <p:txBody>
+          <a:bodyPr/>
+          <a:lstStyle/>
+          <a:p>
+            <a:r>
+              <a:rPr lang="en-US" dirty="0" smtClean="0"/>
+              <a:t>Topic models are algorithms for discovering the main themes that pervade a large and otherwise unstructured collection of documents. Topic models can organize the collection according to the discovered themes.</a:t>
+            </a:r>
+          </a:p>
+        </p:txBody>
+      </p:sp>
+      <p:sp>
+        <p:nvSpPr>
+          <p:cNvPr id="4" name="Slide Number Placeholder 3"/>
+          <p:cNvSpPr>
+            <a:spLocks noGrp="1"/>
+          </p:cNvSpPr>
+          <p:nvPr>
+            <p:ph type="sldNum" sz="quarter" idx="10"/>
+          </p:nvPr>
+        </p:nvSpPr>
+        <p:spPr/>
+        <p:txBody>
+          <a:bodyPr/>
+          <a:lstStyle/>
+          <a:p>
+            <a:fld id="{CA184533-7BC9-4CE8-BD5E-7F40AAB3FD78}" type="slidenum">
+              <a:rPr lang="en-US" smtClean="0"/>
+              <a:t>2</a:t>
+            </a:fld>
+            <a:endParaRPr lang="en-US"/>
+          </a:p>
+        </p:txBody>
+      </p:sp>
+    </p:spTree>
+    <p:extLst>
+      <p:ext uri="{BB962C8B-B14F-4D97-AF65-F5344CB8AC3E}">
+        <p14:creationId xmlns:p14="http://schemas.microsoft.com/office/powerpoint/2010/main" val="2616793681"/>
+      </p:ext>
+    </p:extLst>
+  </p:cSld>
+  <p:clrMapOvr>
+    <a:masterClrMapping/>
+  </p:clrMapOvr>
+</p:notes>
+</file>
+
+<file path=ppt/notesSlides/notesSlide2.xml><?xml version="1.0" encoding="utf-8"?>
+<p:notes xmlns:a="http://schemas.openxmlformats.org/drawingml/2006/main" xmlns:r="http://schemas.openxmlformats.org/officeDocument/2006/relationships" xmlns:p="http://schemas.openxmlformats.org/presentationml/2006/main">
+  <p:cSld>
+    <p:spTree>
+      <p:nvGrpSpPr>
+        <p:cNvPr id="1" name=""/>
+        <p:cNvGrpSpPr/>
+        <p:nvPr/>
+      </p:nvGrpSpPr>
+      <p:grpSpPr>
+        <a:xfrm>
+          <a:off x="0" y="0"/>
+          <a:ext cx="0" cy="0"/>
+          <a:chOff x="0" y="0"/>
+          <a:chExt cx="0" cy="0"/>
+        </a:xfrm>
+      </p:grpSpPr>
+      <p:sp>
+        <p:nvSpPr>
+          <p:cNvPr id="2" name="Slide Image Placeholder 1"/>
+          <p:cNvSpPr>
+            <a:spLocks noGrp="1" noRot="1" noChangeAspect="1"/>
+          </p:cNvSpPr>
+          <p:nvPr>
+            <p:ph type="sldImg"/>
+          </p:nvPr>
+        </p:nvSpPr>
+        <p:spPr/>
+      </p:sp>
+      <p:sp>
+        <p:nvSpPr>
+          <p:cNvPr id="3" name="Notes Placeholder 2"/>
+          <p:cNvSpPr>
+            <a:spLocks noGrp="1"/>
+          </p:cNvSpPr>
+          <p:nvPr>
+            <p:ph type="body" idx="1"/>
+          </p:nvPr>
+        </p:nvSpPr>
+        <p:spPr/>
+        <p:txBody>
+          <a:bodyPr/>
+          <a:lstStyle/>
+          <a:p>
+            <a:r>
+              <a:rPr lang="en-US" sz="1200" b="1" i="0" u="sng" kern="1200" dirty="0" smtClean="0">
+                <a:solidFill>
+                  <a:schemeClr val="tx1"/>
+                </a:solidFill>
+                <a:effectLst/>
+                <a:latin typeface="+mn-lt"/>
+                <a:ea typeface="+mn-ea"/>
+                <a:cs typeface="+mn-cs"/>
+              </a:rPr>
+              <a:t>Latent </a:t>
+            </a:r>
+            <a:r>
+              <a:rPr lang="en-US" sz="1200" b="1" i="0" u="sng" kern="1200" dirty="0" err="1" smtClean="0">
+                <a:solidFill>
+                  <a:schemeClr val="tx1"/>
+                </a:solidFill>
+                <a:effectLst/>
+                <a:latin typeface="+mn-lt"/>
+                <a:ea typeface="+mn-ea"/>
+                <a:cs typeface="+mn-cs"/>
+              </a:rPr>
+              <a:t>Dirichlet</a:t>
+            </a:r>
+            <a:r>
+              <a:rPr lang="en-US" sz="1200" b="1" i="0" u="sng" kern="1200" dirty="0" smtClean="0">
+                <a:solidFill>
+                  <a:schemeClr val="tx1"/>
+                </a:solidFill>
+                <a:effectLst/>
+                <a:latin typeface="+mn-lt"/>
+                <a:ea typeface="+mn-ea"/>
+                <a:cs typeface="+mn-cs"/>
+              </a:rPr>
+              <a:t> Allocation</a:t>
+            </a:r>
+            <a:r>
+              <a:rPr lang="en-US" sz="1200" b="0" i="0" kern="1200" dirty="0" smtClean="0">
+                <a:solidFill>
+                  <a:schemeClr val="tx1"/>
+                </a:solidFill>
+                <a:effectLst/>
+                <a:latin typeface="+mn-lt"/>
+                <a:ea typeface="+mn-ea"/>
+                <a:cs typeface="+mn-cs"/>
+              </a:rPr>
+              <a:t> (LDA) is a common method of </a:t>
+            </a:r>
+            <a:r>
+              <a:rPr lang="en-US" sz="1200" b="1" i="0" kern="1200" dirty="0" smtClean="0">
+                <a:solidFill>
+                  <a:schemeClr val="tx1"/>
+                </a:solidFill>
+                <a:effectLst/>
+                <a:latin typeface="+mn-lt"/>
+                <a:ea typeface="+mn-ea"/>
+                <a:cs typeface="+mn-cs"/>
+              </a:rPr>
+              <a:t>topic modeling</a:t>
+            </a:r>
+            <a:r>
+              <a:rPr lang="en-US" sz="1200" b="0" i="0" kern="1200" dirty="0" smtClean="0">
+                <a:solidFill>
+                  <a:schemeClr val="tx1"/>
+                </a:solidFill>
+                <a:effectLst/>
+                <a:latin typeface="+mn-lt"/>
+                <a:ea typeface="+mn-ea"/>
+                <a:cs typeface="+mn-cs"/>
+              </a:rPr>
+              <a:t>.  That is, if I have a document and want to figure out if it's a sports  article or a mathematics paper, I can use LDA to build a system that  looks at other sports articles or mathematics papers and automatically  decides whether this unseen document's topic is sports or math.</a:t>
+            </a:r>
+            <a:r>
+              <a:rPr lang="en-US" dirty="0" smtClean="0"/>
+              <a:t/>
+            </a:r>
+            <a:br>
+              <a:rPr lang="en-US" dirty="0" smtClean="0"/>
+            </a:br>
+            <a:r>
+              <a:rPr lang="en-US" dirty="0" smtClean="0"/>
+              <a:t/>
+            </a:r>
+            <a:br>
+              <a:rPr lang="en-US" dirty="0" smtClean="0"/>
+            </a:br>
+            <a:r>
+              <a:rPr lang="en-US" sz="1200" b="0" i="0" kern="1200" dirty="0" smtClean="0">
+                <a:solidFill>
+                  <a:schemeClr val="tx1"/>
+                </a:solidFill>
+                <a:effectLst/>
+                <a:latin typeface="+mn-lt"/>
+                <a:ea typeface="+mn-ea"/>
+                <a:cs typeface="+mn-cs"/>
+              </a:rPr>
+              <a:t>To LDA, a document is just a collection of topics where  each topic has some particular probability of generating a particular  word. </a:t>
+            </a:r>
+            <a:endParaRPr lang="en-US" dirty="0" smtClean="0"/>
+          </a:p>
+          <a:p>
+            <a:r>
+              <a:rPr lang="en-US" dirty="0" smtClean="0"/>
+              <a:t>Figure 1. The intuitions behind latent </a:t>
+            </a:r>
+            <a:r>
+              <a:rPr lang="en-US" dirty="0" err="1" smtClean="0"/>
+              <a:t>Dirichlet</a:t>
+            </a:r>
+            <a:r>
+              <a:rPr lang="en-US" dirty="0" smtClean="0"/>
+              <a:t> allocation. We assume that some number of “topics,” which are distributions over words, exist for the whole collection (far left). Each document is assumed to be generated as follows. First choose a distribution over the topics (the histogram at right); then, for each word, choose a topic assignment (the colored coins) and choose the word from the corresponding topic. The topics and topic assignments in this figure are illustrative—they are not fit from real data. </a:t>
+            </a:r>
+          </a:p>
+          <a:p>
+            <a:endParaRPr lang="en-US" dirty="0"/>
+          </a:p>
+        </p:txBody>
+      </p:sp>
+      <p:sp>
+        <p:nvSpPr>
+          <p:cNvPr id="4" name="Slide Number Placeholder 3"/>
+          <p:cNvSpPr>
+            <a:spLocks noGrp="1"/>
+          </p:cNvSpPr>
+          <p:nvPr>
+            <p:ph type="sldNum" sz="quarter" idx="10"/>
+          </p:nvPr>
+        </p:nvSpPr>
+        <p:spPr/>
+        <p:txBody>
+          <a:bodyPr/>
+          <a:lstStyle/>
+          <a:p>
+            <a:fld id="{CA184533-7BC9-4CE8-BD5E-7F40AAB3FD78}" type="slidenum">
+              <a:rPr lang="en-US" smtClean="0"/>
+              <a:t>3</a:t>
+            </a:fld>
+            <a:endParaRPr lang="en-US"/>
+          </a:p>
+        </p:txBody>
+      </p:sp>
+    </p:spTree>
+    <p:extLst>
+      <p:ext uri="{BB962C8B-B14F-4D97-AF65-F5344CB8AC3E}">
+        <p14:creationId xmlns:p14="http://schemas.microsoft.com/office/powerpoint/2010/main" val="3402400564"/>
+      </p:ext>
+    </p:extLst>
+  </p:cSld>
+  <p:clrMapOvr>
+    <a:masterClrMapping/>
+  </p:clrMapOvr>
+</p:notes>
+</file>
+
 <file path=ppt/slideLayouts/slideLayout1.xml><?xml version="1.0" encoding="utf-8"?>
 <p:sldLayout xmlns:a="http://schemas.openxmlformats.org/drawingml/2006/main" xmlns:r="http://schemas.openxmlformats.org/officeDocument/2006/relationships" xmlns:p="http://schemas.openxmlformats.org/presentationml/2006/main" showMasterSp="0" type="title" preserve="1">
   <p:cSld name="Title Slide">
@@ -2709,7 +3336,7 @@
           <a:p>
             <a:fld id="{896DA247-9E52-4CC0-88A0-C1D88E176B19}" type="datetimeFigureOut">
               <a:rPr lang="en-US" smtClean="0"/>
-              <a:t>10/19/2015</a:t>
+              <a:t>10/20/2015</a:t>
             </a:fld>
             <a:endParaRPr lang="en-US"/>
           </a:p>
@@ -2917,7 +3544,7 @@
           <a:p>
             <a:fld id="{896DA247-9E52-4CC0-88A0-C1D88E176B19}" type="datetimeFigureOut">
               <a:rPr lang="en-US" smtClean="0"/>
-              <a:t>10/19/2015</a:t>
+              <a:t>10/20/2015</a:t>
             </a:fld>
             <a:endParaRPr lang="en-US"/>
           </a:p>
@@ -3173,7 +3800,7 @@
           <a:p>
             <a:fld id="{896DA247-9E52-4CC0-88A0-C1D88E176B19}" type="datetimeFigureOut">
               <a:rPr lang="en-US" smtClean="0"/>
-              <a:t>10/19/2015</a:t>
+              <a:t>10/20/2015</a:t>
             </a:fld>
             <a:endParaRPr lang="en-US"/>
           </a:p>
@@ -3343,7 +3970,7 @@
           <a:p>
             <a:fld id="{896DA247-9E52-4CC0-88A0-C1D88E176B19}" type="datetimeFigureOut">
               <a:rPr lang="en-US" smtClean="0"/>
-              <a:t>10/19/2015</a:t>
+              <a:t>10/20/2015</a:t>
             </a:fld>
             <a:endParaRPr lang="en-US"/>
           </a:p>
@@ -3686,7 +4313,7 @@
           <a:p>
             <a:fld id="{896DA247-9E52-4CC0-88A0-C1D88E176B19}" type="datetimeFigureOut">
               <a:rPr lang="en-US" smtClean="0"/>
-              <a:t>10/19/2015</a:t>
+              <a:t>10/20/2015</a:t>
             </a:fld>
             <a:endParaRPr lang="en-US"/>
           </a:p>
@@ -3961,7 +4588,7 @@
           <a:p>
             <a:fld id="{896DA247-9E52-4CC0-88A0-C1D88E176B19}" type="datetimeFigureOut">
               <a:rPr lang="en-US" smtClean="0"/>
-              <a:t>10/19/2015</a:t>
+              <a:t>10/20/2015</a:t>
             </a:fld>
             <a:endParaRPr lang="en-US"/>
           </a:p>
@@ -4347,7 +4974,7 @@
           <a:p>
             <a:fld id="{896DA247-9E52-4CC0-88A0-C1D88E176B19}" type="datetimeFigureOut">
               <a:rPr lang="en-US" smtClean="0"/>
-              <a:t>10/19/2015</a:t>
+              <a:t>10/20/2015</a:t>
             </a:fld>
             <a:endParaRPr lang="en-US"/>
           </a:p>
@@ -4465,7 +5092,7 @@
           <a:p>
             <a:fld id="{896DA247-9E52-4CC0-88A0-C1D88E176B19}" type="datetimeFigureOut">
               <a:rPr lang="en-US" smtClean="0"/>
-              <a:t>10/19/2015</a:t>
+              <a:t>10/20/2015</a:t>
             </a:fld>
             <a:endParaRPr lang="en-US"/>
           </a:p>
@@ -4636,7 +5263,7 @@
           <a:p>
             <a:fld id="{896DA247-9E52-4CC0-88A0-C1D88E176B19}" type="datetimeFigureOut">
               <a:rPr lang="en-US" smtClean="0"/>
-              <a:t>10/19/2015</a:t>
+              <a:t>10/20/2015</a:t>
             </a:fld>
             <a:endParaRPr lang="en-US"/>
           </a:p>
@@ -4990,7 +5617,7 @@
           <a:p>
             <a:fld id="{896DA247-9E52-4CC0-88A0-C1D88E176B19}" type="datetimeFigureOut">
               <a:rPr lang="en-US" smtClean="0"/>
-              <a:t>10/19/2015</a:t>
+              <a:t>10/20/2015</a:t>
             </a:fld>
             <a:endParaRPr lang="en-US"/>
           </a:p>
@@ -5367,7 +5994,7 @@
           <a:p>
             <a:fld id="{896DA247-9E52-4CC0-88A0-C1D88E176B19}" type="datetimeFigureOut">
               <a:rPr lang="en-US" smtClean="0"/>
-              <a:t>10/19/2015</a:t>
+              <a:t>10/20/2015</a:t>
             </a:fld>
             <a:endParaRPr lang="en-US"/>
           </a:p>
@@ -5654,7 +6281,7 @@
           <a:p>
             <a:fld id="{896DA247-9E52-4CC0-88A0-C1D88E176B19}" type="datetimeFigureOut">
               <a:rPr lang="en-US" smtClean="0"/>
-              <a:t>10/19/2015</a:t>
+              <a:t>10/20/2015</a:t>
             </a:fld>
             <a:endParaRPr lang="en-US"/>
           </a:p>
@@ -6280,6 +6907,162 @@
           <a:p>
             <a:r>
               <a:rPr lang="en-US" dirty="0" smtClean="0"/>
+              <a:t>Empirical Tests (Wikipedia Corpus)</a:t>
+            </a:r>
+            <a:endParaRPr lang="en-US" dirty="0"/>
+          </a:p>
+        </p:txBody>
+      </p:sp>
+      <p:sp>
+        <p:nvSpPr>
+          <p:cNvPr id="7" name="Content Placeholder 6"/>
+          <p:cNvSpPr>
+            <a:spLocks noGrp="1"/>
+          </p:cNvSpPr>
+          <p:nvPr>
+            <p:ph sz="half" idx="1"/>
+          </p:nvPr>
+        </p:nvSpPr>
+        <p:spPr>
+          <a:xfrm>
+            <a:off x="1097278" y="1845734"/>
+            <a:ext cx="3992515" cy="4023360"/>
+          </a:xfrm>
+        </p:spPr>
+        <p:txBody>
+          <a:bodyPr/>
+          <a:lstStyle/>
+          <a:p>
+            <a:r>
+              <a:rPr lang="en-US" dirty="0" smtClean="0"/>
+              <a:t>Classify into 12 categories within Business newsgroup </a:t>
+            </a:r>
+          </a:p>
+          <a:p>
+            <a:r>
+              <a:rPr lang="en-US" dirty="0" smtClean="0"/>
+              <a:t>Labelled data</a:t>
+            </a:r>
+          </a:p>
+          <a:p>
+            <a:pPr lvl="1"/>
+            <a:r>
+              <a:rPr lang="en-US" dirty="0" smtClean="0"/>
+              <a:t>Train/Test = 70/30 </a:t>
+            </a:r>
+          </a:p>
+          <a:p>
+            <a:r>
+              <a:rPr lang="en-US" dirty="0" smtClean="0"/>
+              <a:t>DBN outperforms LDA when measuring % accuracy</a:t>
+            </a:r>
+            <a:endParaRPr lang="en-US" dirty="0"/>
+          </a:p>
+        </p:txBody>
+      </p:sp>
+      <p:sp>
+        <p:nvSpPr>
+          <p:cNvPr id="16" name="Content Placeholder 15"/>
+          <p:cNvSpPr>
+            <a:spLocks noGrp="1"/>
+          </p:cNvSpPr>
+          <p:nvPr>
+            <p:ph sz="half" idx="2"/>
+          </p:nvPr>
+        </p:nvSpPr>
+        <p:spPr/>
+        <p:txBody>
+          <a:bodyPr/>
+          <a:lstStyle/>
+          <a:p>
+            <a:endParaRPr lang="en-US"/>
+          </a:p>
+        </p:txBody>
+      </p:sp>
+      <p:pic>
+        <p:nvPicPr>
+          <p:cNvPr id="10" name="Picture 9"/>
+          <p:cNvPicPr>
+            <a:picLocks noChangeAspect="1"/>
+          </p:cNvPicPr>
+          <p:nvPr/>
+        </p:nvPicPr>
+        <p:blipFill>
+          <a:blip r:embed="rId2">
+            <a:extLst>
+              <a:ext uri="{28A0092B-C50C-407E-A947-70E740481C1C}">
+                <a14:useLocalDpi xmlns:a14="http://schemas.microsoft.com/office/drawing/2010/main" val="0"/>
+              </a:ext>
+            </a:extLst>
+          </a:blip>
+          <a:stretch>
+            <a:fillRect/>
+          </a:stretch>
+        </p:blipFill>
+        <p:spPr>
+          <a:xfrm>
+            <a:off x="5263899" y="1845734"/>
+            <a:ext cx="6516244" cy="2988888"/>
+          </a:xfrm>
+          <a:prstGeom prst="rect">
+            <a:avLst/>
+          </a:prstGeom>
+        </p:spPr>
+      </p:pic>
+    </p:spTree>
+    <p:extLst>
+      <p:ext uri="{BB962C8B-B14F-4D97-AF65-F5344CB8AC3E}">
+        <p14:creationId xmlns:p14="http://schemas.microsoft.com/office/powerpoint/2010/main" val="1249192010"/>
+      </p:ext>
+    </p:extLst>
+  </p:cSld>
+  <p:clrMapOvr>
+    <a:masterClrMapping/>
+  </p:clrMapOvr>
+  <p:timing>
+    <p:tnLst>
+      <p:par>
+        <p:cTn id="1" dur="indefinite" restart="never" nodeType="tmRoot"/>
+      </p:par>
+    </p:tnLst>
+  </p:timing>
+</p:sld>
+</file>
+
+<file path=ppt/slides/slide11.xml><?xml version="1.0" encoding="utf-8"?>
+<p:sld xmlns:a="http://schemas.openxmlformats.org/drawingml/2006/main" xmlns:r="http://schemas.openxmlformats.org/officeDocument/2006/relationships" xmlns:p="http://schemas.openxmlformats.org/presentationml/2006/main">
+  <p:cSld>
+    <p:spTree>
+      <p:nvGrpSpPr>
+        <p:cNvPr id="1" name=""/>
+        <p:cNvGrpSpPr/>
+        <p:nvPr/>
+      </p:nvGrpSpPr>
+      <p:grpSpPr>
+        <a:xfrm>
+          <a:off x="0" y="0"/>
+          <a:ext cx="0" cy="0"/>
+          <a:chOff x="0" y="0"/>
+          <a:chExt cx="0" cy="0"/>
+        </a:xfrm>
+      </p:grpSpPr>
+      <p:sp>
+        <p:nvSpPr>
+          <p:cNvPr id="2" name="Title 1"/>
+          <p:cNvSpPr>
+            <a:spLocks noGrp="1"/>
+          </p:cNvSpPr>
+          <p:nvPr>
+            <p:ph type="title"/>
+          </p:nvPr>
+        </p:nvSpPr>
+        <p:spPr/>
+        <p:txBody>
+          <a:bodyPr/>
+          <a:lstStyle/>
+          <a:p>
+            <a:r>
+              <a:rPr lang="en-US" dirty="0" smtClean="0"/>
               <a:t>Empirical Tests (</a:t>
             </a:r>
             <a:r>
@@ -6422,7 +7205,7 @@
 </p:sld>
 </file>
 
-<file path=ppt/slides/slide11.xml><?xml version="1.0" encoding="utf-8"?>
+<file path=ppt/slides/slide12.xml><?xml version="1.0" encoding="utf-8"?>
 <p:sld xmlns:a="http://schemas.openxmlformats.org/drawingml/2006/main" xmlns:r="http://schemas.openxmlformats.org/officeDocument/2006/relationships" xmlns:p="http://schemas.openxmlformats.org/presentationml/2006/main">
   <p:cSld>
     <p:spTree>
@@ -6559,7 +7342,7 @@
 </p:sld>
 </file>
 
-<file path=ppt/slides/slide12.xml><?xml version="1.0" encoding="utf-8"?>
+<file path=ppt/slides/slide13.xml><?xml version="1.0" encoding="utf-8"?>
 <p:sld xmlns:a="http://schemas.openxmlformats.org/drawingml/2006/main" xmlns:r="http://schemas.openxmlformats.org/officeDocument/2006/relationships" xmlns:p="http://schemas.openxmlformats.org/presentationml/2006/main">
   <p:cSld>
     <p:spTree>
@@ -6670,93 +7453,6 @@
 </p:sld>
 </file>
 
-<file path=ppt/slides/slide13.xml><?xml version="1.0" encoding="utf-8"?>
-<p:sld xmlns:a="http://schemas.openxmlformats.org/drawingml/2006/main" xmlns:r="http://schemas.openxmlformats.org/officeDocument/2006/relationships" xmlns:p="http://schemas.openxmlformats.org/presentationml/2006/main">
-  <p:cSld>
-    <p:spTree>
-      <p:nvGrpSpPr>
-        <p:cNvPr id="1" name=""/>
-        <p:cNvGrpSpPr/>
-        <p:nvPr/>
-      </p:nvGrpSpPr>
-      <p:grpSpPr>
-        <a:xfrm>
-          <a:off x="0" y="0"/>
-          <a:ext cx="0" cy="0"/>
-          <a:chOff x="0" y="0"/>
-          <a:chExt cx="0" cy="0"/>
-        </a:xfrm>
-      </p:grpSpPr>
-      <p:sp>
-        <p:nvSpPr>
-          <p:cNvPr id="2" name="Title 1"/>
-          <p:cNvSpPr>
-            <a:spLocks noGrp="1"/>
-          </p:cNvSpPr>
-          <p:nvPr>
-            <p:ph type="title"/>
-          </p:nvPr>
-        </p:nvSpPr>
-        <p:spPr/>
-        <p:txBody>
-          <a:bodyPr/>
-          <a:lstStyle/>
-          <a:p>
-            <a:r>
-              <a:rPr lang="en-US" dirty="0" smtClean="0"/>
-              <a:t>What </a:t>
-            </a:r>
-            <a:r>
-              <a:rPr lang="en-US" smtClean="0"/>
-              <a:t>about Random </a:t>
-            </a:r>
-            <a:r>
-              <a:rPr lang="en-US" dirty="0" smtClean="0"/>
-              <a:t>Forest?</a:t>
-            </a:r>
-            <a:endParaRPr lang="en-US" dirty="0"/>
-          </a:p>
-        </p:txBody>
-      </p:sp>
-      <p:sp>
-        <p:nvSpPr>
-          <p:cNvPr id="3" name="Content Placeholder 2"/>
-          <p:cNvSpPr>
-            <a:spLocks noGrp="1"/>
-          </p:cNvSpPr>
-          <p:nvPr>
-            <p:ph idx="1"/>
-          </p:nvPr>
-        </p:nvSpPr>
-        <p:spPr/>
-        <p:txBody>
-          <a:bodyPr/>
-          <a:lstStyle/>
-          <a:p>
-            <a:endParaRPr lang="en-US"/>
-          </a:p>
-        </p:txBody>
-      </p:sp>
-    </p:spTree>
-    <p:extLst>
-      <p:ext uri="{BB962C8B-B14F-4D97-AF65-F5344CB8AC3E}">
-        <p14:creationId xmlns:p14="http://schemas.microsoft.com/office/powerpoint/2010/main" val="4238509165"/>
-      </p:ext>
-    </p:extLst>
-  </p:cSld>
-  <p:clrMapOvr>
-    <a:masterClrMapping/>
-  </p:clrMapOvr>
-  <p:timing>
-    <p:tnLst>
-      <p:par>
-        <p:cTn id="1" dur="indefinite" restart="never" nodeType="tmRoot"/>
-      </p:par>
-    </p:tnLst>
-  </p:timing>
-</p:sld>
-</file>
-
 <file path=ppt/slides/slide14.xml><?xml version="1.0" encoding="utf-8"?>
 <p:sld xmlns:a="http://schemas.openxmlformats.org/drawingml/2006/main" xmlns:r="http://schemas.openxmlformats.org/officeDocument/2006/relationships" xmlns:p="http://schemas.openxmlformats.org/presentationml/2006/main">
   <p:cSld>
@@ -6807,7 +7503,7 @@
             <p:ph idx="1"/>
             <p:extLst>
               <p:ext uri="{D42A27DB-BD31-4B8C-83A1-F6EECF244321}">
-                <p14:modId xmlns:p14="http://schemas.microsoft.com/office/powerpoint/2010/main" val="1030035250"/>
+                <p14:modId xmlns:p14="http://schemas.microsoft.com/office/powerpoint/2010/main" val="2444429154"/>
               </p:ext>
             </p:extLst>
           </p:nvPr>
@@ -6869,14 +7565,19 @@
             <p:ph type="title"/>
           </p:nvPr>
         </p:nvSpPr>
-        <p:spPr/>
+        <p:spPr>
+          <a:xfrm>
+            <a:off x="616225" y="286603"/>
+            <a:ext cx="11231217" cy="1450757"/>
+          </a:xfrm>
+        </p:spPr>
         <p:txBody>
           <a:bodyPr/>
           <a:lstStyle/>
           <a:p>
             <a:r>
               <a:rPr lang="en-US" dirty="0" smtClean="0"/>
-              <a:t>What is Topic Modeling</a:t>
+              <a:t>Topic Models</a:t>
             </a:r>
             <a:endParaRPr lang="en-US" dirty="0"/>
           </a:p>
@@ -6898,58 +7599,32 @@
           <a:lstStyle/>
           <a:p>
             <a:r>
+              <a:rPr lang="en-US" dirty="0"/>
+              <a:t>Topic models are algorithms for discovering the main themes that pervade a large and otherwise unstructured collection of documents. Topic models can organize the collection according to the discovered </a:t>
+            </a:r>
+            <a:r>
               <a:rPr lang="en-US" dirty="0" smtClean="0"/>
-              <a:t>A generative Model</a:t>
-            </a:r>
-          </a:p>
-          <a:p>
-            <a:pPr lvl="1"/>
-            <a:r>
-              <a:rPr lang="en-US" dirty="0" smtClean="0"/>
-              <a:t>Generate input instead of predicting label directly</a:t>
-            </a:r>
-          </a:p>
-          <a:p>
-            <a:pPr lvl="1"/>
-            <a:r>
-              <a:rPr lang="en-US" dirty="0" smtClean="0"/>
-              <a:t>Adjust weights to maximize probability of generating input</a:t>
-            </a:r>
-          </a:p>
-          <a:p>
-            <a:pPr lvl="2"/>
-            <a:r>
-              <a:rPr lang="en-US" dirty="0" smtClean="0"/>
-              <a:t>Maximizing p(x) not p(</a:t>
-            </a:r>
-            <a:r>
-              <a:rPr lang="en-US" dirty="0" err="1" smtClean="0"/>
-              <a:t>y|x</a:t>
-            </a:r>
-            <a:r>
-              <a:rPr lang="en-US" dirty="0" smtClean="0"/>
-              <a:t>)</a:t>
-            </a:r>
-          </a:p>
-          <a:p>
-            <a:pPr lvl="2"/>
-            <a:r>
-              <a:rPr lang="en-US" dirty="0" smtClean="0"/>
-              <a:t>Learn to write vs. Learn to read</a:t>
-            </a:r>
-          </a:p>
-          <a:p>
-            <a:r>
-              <a:rPr lang="en-US" dirty="0" smtClean="0"/>
-              <a:t>Top two layers are Restricted Boltzmann Machines (RBM)</a:t>
-            </a:r>
-          </a:p>
-          <a:p>
-            <a:r>
-              <a:rPr lang="en-US" dirty="0" smtClean="0"/>
-              <a:t>Other layers are Sigmoid Belief Net (SBN)</a:t>
-            </a:r>
+              <a:t>themes.</a:t>
+            </a:r>
+          </a:p>
+          <a:p>
+            <a:r>
+              <a:rPr lang="en-US" dirty="0"/>
+              <a:t>Topic modeling algorithms do not require any prior annotations or labeling of the documents—the topics emerge from the analysis of the original texts. Topic modeling enables us to organize and summarize electronic archives at a scale that would be impossible by human annotation.</a:t>
+            </a:r>
+            <a:endParaRPr lang="en-US" dirty="0" smtClean="0"/>
+          </a:p>
+          <a:p>
             <a:endParaRPr lang="en-US" dirty="0"/>
+          </a:p>
+          <a:p>
+            <a:endParaRPr lang="en-US" dirty="0" smtClean="0"/>
+          </a:p>
+          <a:p>
+            <a:endParaRPr lang="en-US" dirty="0"/>
+          </a:p>
+          <a:p>
+            <a:endParaRPr lang="en-US" dirty="0" smtClean="0"/>
           </a:p>
         </p:txBody>
       </p:sp>
@@ -7000,7 +7675,12 @@
             <p:ph type="title"/>
           </p:nvPr>
         </p:nvSpPr>
-        <p:spPr/>
+        <p:spPr>
+          <a:xfrm>
+            <a:off x="1097280" y="224611"/>
+            <a:ext cx="10058400" cy="1077248"/>
+          </a:xfrm>
+        </p:spPr>
         <p:txBody>
           <a:bodyPr/>
           <a:lstStyle/>
@@ -7010,92 +7690,80 @@
               <a:t>What is Latent </a:t>
             </a:r>
             <a:r>
-              <a:rPr lang="en-US" dirty="0" err="1" smtClean="0"/>
+              <a:rPr lang="en-US" dirty="0" err="1"/>
               <a:t>Dirichlet</a:t>
             </a:r>
             <a:r>
-              <a:rPr lang="en-US" dirty="0" smtClean="0"/>
-              <a:t> Analysis (LDA) </a:t>
-            </a:r>
-            <a:endParaRPr lang="en-US" dirty="0"/>
+              <a:rPr lang="en-US" dirty="0"/>
+              <a:t> Allocation</a:t>
+            </a:r>
           </a:p>
         </p:txBody>
       </p:sp>
-      <p:sp>
-        <p:nvSpPr>
-          <p:cNvPr id="3" name="Content Placeholder 2"/>
-          <p:cNvSpPr>
-            <a:spLocks noGrp="1"/>
-          </p:cNvSpPr>
+      <p:pic>
+        <p:nvPicPr>
+          <p:cNvPr id="4" name="Content Placeholder 3"/>
+          <p:cNvPicPr>
+            <a:picLocks noGrp="1" noChangeAspect="1"/>
+          </p:cNvPicPr>
           <p:nvPr>
             <p:ph idx="1"/>
           </p:nvPr>
-        </p:nvSpPr>
-        <p:spPr/>
+        </p:nvPicPr>
+        <p:blipFill>
+          <a:blip r:embed="rId3"/>
+          <a:stretch>
+            <a:fillRect/>
+          </a:stretch>
+        </p:blipFill>
+        <p:spPr>
+          <a:xfrm>
+            <a:off x="1501877" y="1301859"/>
+            <a:ext cx="9249205" cy="4392340"/>
+          </a:xfrm>
+          <a:prstGeom prst="rect">
+            <a:avLst/>
+          </a:prstGeom>
+        </p:spPr>
+      </p:pic>
+      <p:sp>
+        <p:nvSpPr>
+          <p:cNvPr id="5" name="TextBox 4"/>
+          <p:cNvSpPr txBox="1"/>
+          <p:nvPr/>
+        </p:nvSpPr>
+        <p:spPr>
+          <a:xfrm>
+            <a:off x="1891037" y="5694199"/>
+            <a:ext cx="8030378" cy="338554"/>
+          </a:xfrm>
+          <a:prstGeom prst="rect">
+            <a:avLst/>
+          </a:prstGeom>
+          <a:noFill/>
+        </p:spPr>
         <p:txBody>
-          <a:bodyPr/>
+          <a:bodyPr wrap="square" rtlCol="0">
+            <a:spAutoFit/>
+          </a:bodyPr>
           <a:lstStyle/>
           <a:p>
             <a:r>
-              <a:rPr lang="en-US" dirty="0" smtClean="0"/>
-              <a:t>A generative Model</a:t>
-            </a:r>
-          </a:p>
-          <a:p>
-            <a:pPr lvl="1"/>
-            <a:r>
-              <a:rPr lang="en-US" dirty="0" smtClean="0"/>
-              <a:t>Generate input instead of predicting label directly</a:t>
-            </a:r>
-          </a:p>
-          <a:p>
-            <a:pPr lvl="1"/>
-            <a:r>
-              <a:rPr lang="en-US" dirty="0" smtClean="0"/>
-              <a:t>Adjust weights to maximize probability of generating input</a:t>
-            </a:r>
-          </a:p>
-          <a:p>
-            <a:pPr lvl="2"/>
-            <a:r>
-              <a:rPr lang="en-US" dirty="0" smtClean="0"/>
-              <a:t>Maximizing p(x) not p(</a:t>
-            </a:r>
-            <a:r>
-              <a:rPr lang="en-US" dirty="0" err="1" smtClean="0"/>
-              <a:t>y|x</a:t>
-            </a:r>
-            <a:r>
-              <a:rPr lang="en-US" dirty="0" smtClean="0"/>
-              <a:t>)</a:t>
-            </a:r>
-          </a:p>
-          <a:p>
-            <a:pPr lvl="2"/>
-            <a:r>
-              <a:rPr lang="en-US" dirty="0" smtClean="0"/>
-              <a:t>Learn to write vs. Learn to read</a:t>
-            </a:r>
-          </a:p>
-          <a:p>
-            <a:r>
-              <a:rPr lang="en-US" dirty="0" smtClean="0"/>
-              <a:t>Top two layers are Restricted Boltzmann Machines (RBM)</a:t>
-            </a:r>
-          </a:p>
-          <a:p>
-            <a:r>
-              <a:rPr lang="en-US" dirty="0" smtClean="0"/>
-              <a:t>Other layers are Sigmoid Belief Net (SBN)</a:t>
-            </a:r>
-            <a:endParaRPr lang="en-US" dirty="0"/>
+              <a:rPr lang="en-US" sz="1600" dirty="0" smtClean="0"/>
+              <a:t>Source: </a:t>
+            </a:r>
+            <a:r>
+              <a:rPr lang="en-US" sz="1600" dirty="0"/>
+              <a:t>https://www.cs.princeton.edu/~blei/papers/Blei2012.pdf</a:t>
+            </a:r>
+            <a:endParaRPr lang="en-US" sz="1600" dirty="0"/>
           </a:p>
         </p:txBody>
       </p:sp>
     </p:spTree>
     <p:extLst>
       <p:ext uri="{BB962C8B-B14F-4D97-AF65-F5344CB8AC3E}">
-        <p14:creationId xmlns:p14="http://schemas.microsoft.com/office/powerpoint/2010/main" val="91579455"/>
+        <p14:creationId xmlns:p14="http://schemas.microsoft.com/office/powerpoint/2010/main" val="576650278"/>
       </p:ext>
     </p:extLst>
   </p:cSld>
@@ -7139,6 +7807,446 @@
             <p:ph type="title"/>
           </p:nvPr>
         </p:nvSpPr>
+        <p:spPr>
+          <a:xfrm>
+            <a:off x="1097280" y="0"/>
+            <a:ext cx="10058400" cy="1450757"/>
+          </a:xfrm>
+        </p:spPr>
+        <p:txBody>
+          <a:bodyPr/>
+          <a:lstStyle/>
+          <a:p>
+            <a:r>
+              <a:rPr lang="en-US" dirty="0" smtClean="0"/>
+              <a:t>LDA Generative Model</a:t>
+            </a:r>
+            <a:endParaRPr lang="en-US" dirty="0"/>
+          </a:p>
+        </p:txBody>
+      </p:sp>
+      <p:pic>
+        <p:nvPicPr>
+          <p:cNvPr id="4" name="Content Placeholder 3"/>
+          <p:cNvPicPr>
+            <a:picLocks noGrp="1" noChangeAspect="1"/>
+          </p:cNvPicPr>
+          <p:nvPr>
+            <p:ph idx="1"/>
+          </p:nvPr>
+        </p:nvPicPr>
+        <p:blipFill>
+          <a:blip r:embed="rId2"/>
+          <a:stretch>
+            <a:fillRect/>
+          </a:stretch>
+        </p:blipFill>
+        <p:spPr>
+          <a:xfrm>
+            <a:off x="743919" y="1303407"/>
+            <a:ext cx="10910807" cy="3129108"/>
+          </a:xfrm>
+          <a:prstGeom prst="rect">
+            <a:avLst/>
+          </a:prstGeom>
+        </p:spPr>
+      </p:pic>
+      <p:pic>
+        <p:nvPicPr>
+          <p:cNvPr id="5" name="Picture 4"/>
+          <p:cNvPicPr>
+            <a:picLocks noChangeAspect="1"/>
+          </p:cNvPicPr>
+          <p:nvPr/>
+        </p:nvPicPr>
+        <p:blipFill>
+          <a:blip r:embed="rId3"/>
+          <a:stretch>
+            <a:fillRect/>
+          </a:stretch>
+        </p:blipFill>
+        <p:spPr>
+          <a:xfrm>
+            <a:off x="918154" y="4432515"/>
+            <a:ext cx="3008462" cy="1851565"/>
+          </a:xfrm>
+          <a:prstGeom prst="rect">
+            <a:avLst/>
+          </a:prstGeom>
+        </p:spPr>
+      </p:pic>
+      <mc:AlternateContent xmlns:mc="http://schemas.openxmlformats.org/markup-compatibility/2006">
+        <mc:Choice xmlns:a14="http://schemas.microsoft.com/office/drawing/2010/main" Requires="a14">
+          <p:sp>
+            <p:nvSpPr>
+              <p:cNvPr id="6" name="Rectangle 5"/>
+              <p:cNvSpPr/>
+              <p:nvPr/>
+            </p:nvSpPr>
+            <p:spPr>
+              <a:xfrm>
+                <a:off x="3858872" y="4432515"/>
+                <a:ext cx="4535216" cy="506870"/>
+              </a:xfrm>
+              <a:prstGeom prst="rect">
+                <a:avLst/>
+              </a:prstGeom>
+            </p:spPr>
+            <p:txBody>
+              <a:bodyPr wrap="none">
+                <a:spAutoFit/>
+              </a:bodyPr>
+              <a:lstStyle/>
+              <a:p>
+                <a14:m>
+                  <m:oMathPara xmlns:m="http://schemas.openxmlformats.org/officeDocument/2006/math">
+                    <m:oMathParaPr>
+                      <m:jc m:val="centerGroup"/>
+                    </m:oMathParaPr>
+                    <m:oMath xmlns:m="http://schemas.openxmlformats.org/officeDocument/2006/math">
+                      <m:r>
+                        <a:rPr lang="en-US" i="1">
+                          <a:latin typeface="Cambria Math" panose="02040503050406030204" pitchFamily="18" charset="0"/>
+                        </a:rPr>
+                        <m:t>𝑝</m:t>
+                      </m:r>
+                      <m:d>
+                        <m:dPr>
+                          <m:ctrlPr>
+                            <a:rPr lang="en-US" i="1">
+                              <a:latin typeface="Cambria Math" panose="02040503050406030204" pitchFamily="18" charset="0"/>
+                            </a:rPr>
+                          </m:ctrlPr>
+                        </m:dPr>
+                        <m:e>
+                          <m:sSubSup>
+                            <m:sSubSupPr>
+                              <m:ctrlPr>
+                                <a:rPr lang="en-US" i="1">
+                                  <a:latin typeface="Cambria Math" panose="02040503050406030204" pitchFamily="18" charset="0"/>
+                                </a:rPr>
+                              </m:ctrlPr>
+                            </m:sSubSupPr>
+                            <m:e>
+                              <m:r>
+                                <a:rPr lang="en-US" i="1">
+                                  <a:latin typeface="Cambria Math" panose="02040503050406030204" pitchFamily="18" charset="0"/>
+                                </a:rPr>
+                                <m:t>h</m:t>
+                              </m:r>
+                            </m:e>
+                            <m:sub>
+                              <m:r>
+                                <a:rPr lang="en-US" i="1">
+                                  <a:latin typeface="Cambria Math" panose="02040503050406030204" pitchFamily="18" charset="0"/>
+                                </a:rPr>
+                                <m:t>𝑗</m:t>
+                              </m:r>
+                            </m:sub>
+                            <m:sup>
+                              <m:d>
+                                <m:dPr>
+                                  <m:ctrlPr>
+                                    <a:rPr lang="en-US" i="1">
+                                      <a:latin typeface="Cambria Math" panose="02040503050406030204" pitchFamily="18" charset="0"/>
+                                    </a:rPr>
+                                  </m:ctrlPr>
+                                </m:dPr>
+                                <m:e>
+                                  <m:r>
+                                    <a:rPr lang="en-US" i="1">
+                                      <a:latin typeface="Cambria Math" panose="02040503050406030204" pitchFamily="18" charset="0"/>
+                                    </a:rPr>
+                                    <m:t>1</m:t>
+                                  </m:r>
+                                </m:e>
+                              </m:d>
+                            </m:sup>
+                          </m:sSubSup>
+                          <m:r>
+                            <a:rPr lang="en-US" i="1">
+                              <a:latin typeface="Cambria Math" panose="02040503050406030204" pitchFamily="18" charset="0"/>
+                            </a:rPr>
+                            <m:t>=1</m:t>
+                          </m:r>
+                        </m:e>
+                        <m:e>
+                          <m:sSup>
+                            <m:sSupPr>
+                              <m:ctrlPr>
+                                <a:rPr lang="en-US" i="1">
+                                  <a:latin typeface="Cambria Math" panose="02040503050406030204" pitchFamily="18" charset="0"/>
+                                </a:rPr>
+                              </m:ctrlPr>
+                            </m:sSupPr>
+                            <m:e>
+                              <m:r>
+                                <a:rPr lang="en-US" i="1">
+                                  <a:latin typeface="Cambria Math" panose="02040503050406030204" pitchFamily="18" charset="0"/>
+                                </a:rPr>
+                                <m:t>h</m:t>
+                              </m:r>
+                            </m:e>
+                            <m:sup>
+                              <m:d>
+                                <m:dPr>
+                                  <m:ctrlPr>
+                                    <a:rPr lang="en-US" i="1">
+                                      <a:latin typeface="Cambria Math" panose="02040503050406030204" pitchFamily="18" charset="0"/>
+                                    </a:rPr>
+                                  </m:ctrlPr>
+                                </m:dPr>
+                                <m:e>
+                                  <m:r>
+                                    <a:rPr lang="en-US" i="1">
+                                      <a:latin typeface="Cambria Math" panose="02040503050406030204" pitchFamily="18" charset="0"/>
+                                    </a:rPr>
+                                    <m:t>2</m:t>
+                                  </m:r>
+                                </m:e>
+                              </m:d>
+                            </m:sup>
+                          </m:sSup>
+                        </m:e>
+                      </m:d>
+                      <m:r>
+                        <a:rPr lang="en-US" i="1">
+                          <a:latin typeface="Cambria Math" panose="02040503050406030204" pitchFamily="18" charset="0"/>
+                        </a:rPr>
+                        <m:t>=</m:t>
+                      </m:r>
+                      <m:r>
+                        <a:rPr lang="en-US" i="1">
+                          <a:latin typeface="Cambria Math" panose="02040503050406030204" pitchFamily="18" charset="0"/>
+                        </a:rPr>
+                        <m:t>𝑠𝑖𝑔𝑚</m:t>
+                      </m:r>
+                      <m:r>
+                        <a:rPr lang="en-US" i="1">
+                          <a:latin typeface="Cambria Math" panose="02040503050406030204" pitchFamily="18" charset="0"/>
+                        </a:rPr>
+                        <m:t>(</m:t>
+                      </m:r>
+                      <m:sSup>
+                        <m:sSupPr>
+                          <m:ctrlPr>
+                            <a:rPr lang="en-US" i="1">
+                              <a:latin typeface="Cambria Math" panose="02040503050406030204" pitchFamily="18" charset="0"/>
+                            </a:rPr>
+                          </m:ctrlPr>
+                        </m:sSupPr>
+                        <m:e>
+                          <m:r>
+                            <a:rPr lang="en-US" i="1">
+                              <a:latin typeface="Cambria Math" panose="02040503050406030204" pitchFamily="18" charset="0"/>
+                            </a:rPr>
+                            <m:t>𝑏</m:t>
+                          </m:r>
+                        </m:e>
+                        <m:sup>
+                          <m:d>
+                            <m:dPr>
+                              <m:ctrlPr>
+                                <a:rPr lang="en-US" i="1">
+                                  <a:latin typeface="Cambria Math" panose="02040503050406030204" pitchFamily="18" charset="0"/>
+                                </a:rPr>
+                              </m:ctrlPr>
+                            </m:dPr>
+                            <m:e>
+                              <m:r>
+                                <a:rPr lang="en-US" i="1">
+                                  <a:latin typeface="Cambria Math" panose="02040503050406030204" pitchFamily="18" charset="0"/>
+                                </a:rPr>
+                                <m:t>1</m:t>
+                              </m:r>
+                            </m:e>
+                          </m:d>
+                        </m:sup>
+                      </m:sSup>
+                      <m:r>
+                        <a:rPr lang="en-US" i="1">
+                          <a:latin typeface="Cambria Math" panose="02040503050406030204" pitchFamily="18" charset="0"/>
+                        </a:rPr>
+                        <m:t>+</m:t>
+                      </m:r>
+                      <m:sSup>
+                        <m:sSupPr>
+                          <m:ctrlPr>
+                            <a:rPr lang="en-US" i="1">
+                              <a:latin typeface="Cambria Math" panose="02040503050406030204" pitchFamily="18" charset="0"/>
+                            </a:rPr>
+                          </m:ctrlPr>
+                        </m:sSupPr>
+                        <m:e>
+                          <m:r>
+                            <a:rPr lang="en-US" i="1">
+                              <a:latin typeface="Cambria Math" panose="02040503050406030204" pitchFamily="18" charset="0"/>
+                            </a:rPr>
+                            <m:t>𝑊</m:t>
+                          </m:r>
+                        </m:e>
+                        <m:sup>
+                          <m:d>
+                            <m:dPr>
+                              <m:ctrlPr>
+                                <a:rPr lang="en-US" i="1">
+                                  <a:latin typeface="Cambria Math" panose="02040503050406030204" pitchFamily="18" charset="0"/>
+                                </a:rPr>
+                              </m:ctrlPr>
+                            </m:dPr>
+                            <m:e>
+                              <m:r>
+                                <a:rPr lang="en-US" i="1">
+                                  <a:latin typeface="Cambria Math" panose="02040503050406030204" pitchFamily="18" charset="0"/>
+                                </a:rPr>
+                                <m:t>2</m:t>
+                              </m:r>
+                            </m:e>
+                          </m:d>
+                          <m:r>
+                            <a:rPr lang="en-US" i="1">
+                              <a:latin typeface="Cambria Math" panose="02040503050406030204" pitchFamily="18" charset="0"/>
+                            </a:rPr>
+                            <m:t>𝑇</m:t>
+                          </m:r>
+                        </m:sup>
+                      </m:sSup>
+                      <m:sSup>
+                        <m:sSupPr>
+                          <m:ctrlPr>
+                            <a:rPr lang="en-US" i="1">
+                              <a:latin typeface="Cambria Math" panose="02040503050406030204" pitchFamily="18" charset="0"/>
+                            </a:rPr>
+                          </m:ctrlPr>
+                        </m:sSupPr>
+                        <m:e>
+                          <m:r>
+                            <a:rPr lang="en-US" i="1">
+                              <a:latin typeface="Cambria Math" panose="02040503050406030204" pitchFamily="18" charset="0"/>
+                            </a:rPr>
+                            <m:t>h</m:t>
+                          </m:r>
+                        </m:e>
+                        <m:sup>
+                          <m:d>
+                            <m:dPr>
+                              <m:ctrlPr>
+                                <a:rPr lang="en-US" i="1">
+                                  <a:latin typeface="Cambria Math" panose="02040503050406030204" pitchFamily="18" charset="0"/>
+                                </a:rPr>
+                              </m:ctrlPr>
+                            </m:dPr>
+                            <m:e>
+                              <m:r>
+                                <a:rPr lang="en-US" i="1">
+                                  <a:latin typeface="Cambria Math" panose="02040503050406030204" pitchFamily="18" charset="0"/>
+                                </a:rPr>
+                                <m:t>2</m:t>
+                              </m:r>
+                            </m:e>
+                          </m:d>
+                        </m:sup>
+                      </m:sSup>
+                      <m:r>
+                        <a:rPr lang="en-US" i="1">
+                          <a:latin typeface="Cambria Math" panose="02040503050406030204" pitchFamily="18" charset="0"/>
+                        </a:rPr>
+                        <m:t>)</m:t>
+                      </m:r>
+                    </m:oMath>
+                  </m:oMathPara>
+                </a14:m>
+                <a:endParaRPr lang="en-US" dirty="0"/>
+              </a:p>
+            </p:txBody>
+          </p:sp>
+        </mc:Choice>
+        <mc:Fallback>
+          <p:sp>
+            <p:nvSpPr>
+              <p:cNvPr id="6" name="Rectangle 5"/>
+              <p:cNvSpPr>
+                <a:spLocks noRot="1" noChangeAspect="1" noMove="1" noResize="1" noEditPoints="1" noAdjustHandles="1" noChangeArrowheads="1" noChangeShapeType="1" noTextEdit="1"/>
+              </p:cNvSpPr>
+              <p:nvPr/>
+            </p:nvSpPr>
+            <p:spPr>
+              <a:xfrm>
+                <a:off x="3858872" y="4432515"/>
+                <a:ext cx="4535216" cy="506870"/>
+              </a:xfrm>
+              <a:prstGeom prst="rect">
+                <a:avLst/>
+              </a:prstGeom>
+              <a:blipFill rotWithShape="0">
+                <a:blip r:embed="rId4"/>
+                <a:stretch>
+                  <a:fillRect b="-2410"/>
+                </a:stretch>
+              </a:blipFill>
+            </p:spPr>
+            <p:txBody>
+              <a:bodyPr/>
+              <a:lstStyle/>
+              <a:p>
+                <a:r>
+                  <a:rPr lang="en-US">
+                    <a:noFill/>
+                  </a:rPr>
+                  <a:t> </a:t>
+                </a:r>
+              </a:p>
+            </p:txBody>
+          </p:sp>
+        </mc:Fallback>
+      </mc:AlternateContent>
+    </p:spTree>
+    <p:extLst>
+      <p:ext uri="{BB962C8B-B14F-4D97-AF65-F5344CB8AC3E}">
+        <p14:creationId xmlns:p14="http://schemas.microsoft.com/office/powerpoint/2010/main" val="3464719565"/>
+      </p:ext>
+    </p:extLst>
+  </p:cSld>
+  <p:clrMapOvr>
+    <a:masterClrMapping/>
+  </p:clrMapOvr>
+  <p:timing>
+    <p:tnLst>
+      <p:par>
+        <p:cTn id="1" dur="indefinite" restart="never" nodeType="tmRoot"/>
+      </p:par>
+    </p:tnLst>
+  </p:timing>
+</p:sld>
+</file>
+
+<file path=ppt/slides/slide5.xml><?xml version="1.0" encoding="utf-8"?>
+<p:sld xmlns:a="http://schemas.openxmlformats.org/drawingml/2006/main" xmlns:r="http://schemas.openxmlformats.org/officeDocument/2006/relationships" xmlns:p="http://schemas.openxmlformats.org/presentationml/2006/main">
+  <p:cSld>
+    <p:spTree>
+      <p:nvGrpSpPr>
+        <p:cNvPr id="1" name=""/>
+        <p:cNvGrpSpPr/>
+        <p:nvPr/>
+      </p:nvGrpSpPr>
+      <p:grpSpPr>
+        <a:xfrm>
+          <a:off x="0" y="0"/>
+          <a:ext cx="0" cy="0"/>
+          <a:chOff x="0" y="0"/>
+          <a:chExt cx="0" cy="0"/>
+        </a:xfrm>
+      </p:grpSpPr>
+      <p:sp>
+        <p:nvSpPr>
+          <p:cNvPr id="2" name="Title 1"/>
+          <p:cNvSpPr>
+            <a:spLocks noGrp="1"/>
+          </p:cNvSpPr>
+          <p:nvPr>
+            <p:ph type="title"/>
+          </p:nvPr>
+        </p:nvSpPr>
         <p:spPr/>
         <p:txBody>
           <a:bodyPr/>
@@ -7243,7 +8351,7 @@
 </p:sld>
 </file>
 
-<file path=ppt/slides/slide5.xml><?xml version="1.0" encoding="utf-8"?>
+<file path=ppt/slides/slide6.xml><?xml version="1.0" encoding="utf-8"?>
 <p:sld xmlns:a="http://schemas.openxmlformats.org/drawingml/2006/main" xmlns:r="http://schemas.openxmlformats.org/officeDocument/2006/relationships" xmlns:p="http://schemas.openxmlformats.org/presentationml/2006/main">
   <p:cSld>
     <p:spTree>
@@ -8059,7 +9167,7 @@
         </p:nvSpPr>
         <p:spPr>
           <a:xfrm>
-            <a:off x="1097280" y="5877951"/>
+            <a:off x="1407246" y="5926674"/>
             <a:ext cx="8030378" cy="338554"/>
           </a:xfrm>
           <a:prstGeom prst="rect">
@@ -8085,237 +9193,6 @@
     <p:extLst>
       <p:ext uri="{BB962C8B-B14F-4D97-AF65-F5344CB8AC3E}">
         <p14:creationId xmlns:p14="http://schemas.microsoft.com/office/powerpoint/2010/main" val="3084265939"/>
-      </p:ext>
-    </p:extLst>
-  </p:cSld>
-  <p:clrMapOvr>
-    <a:masterClrMapping/>
-  </p:clrMapOvr>
-  <p:timing>
-    <p:tnLst>
-      <p:par>
-        <p:cTn id="1" dur="indefinite" restart="never" nodeType="tmRoot"/>
-      </p:par>
-    </p:tnLst>
-  </p:timing>
-</p:sld>
-</file>
-
-<file path=ppt/slides/slide6.xml><?xml version="1.0" encoding="utf-8"?>
-<p:sld xmlns:a="http://schemas.openxmlformats.org/drawingml/2006/main" xmlns:r="http://schemas.openxmlformats.org/officeDocument/2006/relationships" xmlns:p="http://schemas.openxmlformats.org/presentationml/2006/main">
-  <p:cSld>
-    <p:spTree>
-      <p:nvGrpSpPr>
-        <p:cNvPr id="1" name=""/>
-        <p:cNvGrpSpPr/>
-        <p:nvPr/>
-      </p:nvGrpSpPr>
-      <p:grpSpPr>
-        <a:xfrm>
-          <a:off x="0" y="0"/>
-          <a:ext cx="0" cy="0"/>
-          <a:chOff x="0" y="0"/>
-          <a:chExt cx="0" cy="0"/>
-        </a:xfrm>
-      </p:grpSpPr>
-      <p:sp>
-        <p:nvSpPr>
-          <p:cNvPr id="2" name="Title 1"/>
-          <p:cNvSpPr>
-            <a:spLocks noGrp="1"/>
-          </p:cNvSpPr>
-          <p:nvPr>
-            <p:ph type="title"/>
-          </p:nvPr>
-        </p:nvSpPr>
-        <p:spPr/>
-        <p:txBody>
-          <a:bodyPr/>
-          <a:lstStyle/>
-          <a:p>
-            <a:r>
-              <a:rPr lang="en-US" dirty="0" smtClean="0"/>
-              <a:t>Training DBN</a:t>
-            </a:r>
-            <a:endParaRPr lang="en-US" dirty="0"/>
-          </a:p>
-        </p:txBody>
-      </p:sp>
-      <p:sp>
-        <p:nvSpPr>
-          <p:cNvPr id="9" name="Content Placeholder 8"/>
-          <p:cNvSpPr>
-            <a:spLocks noGrp="1"/>
-          </p:cNvSpPr>
-          <p:nvPr>
-            <p:ph sz="half" idx="1"/>
-          </p:nvPr>
-        </p:nvSpPr>
-        <p:spPr/>
-        <p:txBody>
-          <a:bodyPr/>
-          <a:lstStyle/>
-          <a:p>
-            <a:endParaRPr lang="en-US"/>
-          </a:p>
-        </p:txBody>
-      </p:sp>
-      <p:sp>
-        <p:nvSpPr>
-          <p:cNvPr id="10" name="Content Placeholder 9"/>
-          <p:cNvSpPr>
-            <a:spLocks noGrp="1"/>
-          </p:cNvSpPr>
-          <p:nvPr>
-            <p:ph sz="half" idx="2"/>
-          </p:nvPr>
-        </p:nvSpPr>
-        <p:spPr>
-          <a:xfrm>
-            <a:off x="8088630" y="1845735"/>
-            <a:ext cx="3067050" cy="4023360"/>
-          </a:xfrm>
-        </p:spPr>
-        <p:txBody>
-          <a:bodyPr/>
-          <a:lstStyle/>
-          <a:p>
-            <a:r>
-              <a:rPr lang="en-US" dirty="0" smtClean="0"/>
-              <a:t>Step 1: Train one layer at a time using RBM</a:t>
-            </a:r>
-          </a:p>
-          <a:p>
-            <a:r>
-              <a:rPr lang="en-US" dirty="0" smtClean="0"/>
-              <a:t>Step 2: Use weights to initialize the stack</a:t>
-            </a:r>
-          </a:p>
-          <a:p>
-            <a:r>
-              <a:rPr lang="en-US" dirty="0" smtClean="0"/>
-              <a:t>Step 3: Train only upper layer (RBM)</a:t>
-            </a:r>
-          </a:p>
-          <a:p>
-            <a:r>
-              <a:rPr lang="en-US" dirty="0" smtClean="0"/>
-              <a:t>Step 4: Stack up another layer and repeat </a:t>
-            </a:r>
-          </a:p>
-          <a:p>
-            <a:r>
-              <a:rPr lang="en-US" dirty="0" smtClean="0"/>
-              <a:t>Notice that lower level is only a pass-through</a:t>
-            </a:r>
-            <a:endParaRPr lang="en-US" dirty="0"/>
-          </a:p>
-        </p:txBody>
-      </p:sp>
-      <p:sp>
-        <p:nvSpPr>
-          <p:cNvPr id="4" name="TextBox 3"/>
-          <p:cNvSpPr txBox="1"/>
-          <p:nvPr/>
-        </p:nvSpPr>
-        <p:spPr>
-          <a:xfrm>
-            <a:off x="1097280" y="5808190"/>
-            <a:ext cx="8030378" cy="338554"/>
-          </a:xfrm>
-          <a:prstGeom prst="rect">
-            <a:avLst/>
-          </a:prstGeom>
-          <a:noFill/>
-        </p:spPr>
-        <p:txBody>
-          <a:bodyPr wrap="square" rtlCol="0">
-            <a:spAutoFit/>
-          </a:bodyPr>
-          <a:lstStyle/>
-          <a:p>
-            <a:r>
-              <a:rPr lang="en-US" sz="1600" dirty="0" smtClean="0"/>
-              <a:t>Source: http://info.usherbrooke.ca/hlarochelle/neural_networks/content.html</a:t>
-            </a:r>
-            <a:endParaRPr lang="en-US" sz="1600" dirty="0"/>
-          </a:p>
-        </p:txBody>
-      </p:sp>
-      <p:pic>
-        <p:nvPicPr>
-          <p:cNvPr id="6" name="Picture 5"/>
-          <p:cNvPicPr>
-            <a:picLocks noChangeAspect="1"/>
-          </p:cNvPicPr>
-          <p:nvPr/>
-        </p:nvPicPr>
-        <p:blipFill>
-          <a:blip r:embed="rId2">
-            <a:extLst>
-              <a:ext uri="{28A0092B-C50C-407E-A947-70E740481C1C}">
-                <a14:useLocalDpi xmlns:a14="http://schemas.microsoft.com/office/drawing/2010/main" val="0"/>
-              </a:ext>
-            </a:extLst>
-          </a:blip>
-          <a:stretch>
-            <a:fillRect/>
-          </a:stretch>
-        </p:blipFill>
-        <p:spPr>
-          <a:xfrm>
-            <a:off x="1097280" y="1901112"/>
-            <a:ext cx="6991350" cy="3743325"/>
-          </a:xfrm>
-          <a:prstGeom prst="rect">
-            <a:avLst/>
-          </a:prstGeom>
-        </p:spPr>
-      </p:pic>
-      <p:sp>
-        <p:nvSpPr>
-          <p:cNvPr id="8" name="Right Arrow 7"/>
-          <p:cNvSpPr/>
-          <p:nvPr/>
-        </p:nvSpPr>
-        <p:spPr>
-          <a:xfrm>
-            <a:off x="4093524" y="4439798"/>
-            <a:ext cx="705079" cy="462708"/>
-          </a:xfrm>
-          <a:prstGeom prst="rightArrow">
-            <a:avLst/>
-          </a:prstGeom>
-        </p:spPr>
-        <p:style>
-          <a:lnRef idx="2">
-            <a:schemeClr val="accent1">
-              <a:shade val="50000"/>
-            </a:schemeClr>
-          </a:lnRef>
-          <a:fillRef idx="1">
-            <a:schemeClr val="accent1"/>
-          </a:fillRef>
-          <a:effectRef idx="0">
-            <a:schemeClr val="accent1"/>
-          </a:effectRef>
-          <a:fontRef idx="minor">
-            <a:schemeClr val="lt1"/>
-          </a:fontRef>
-        </p:style>
-        <p:txBody>
-          <a:bodyPr rtlCol="0" anchor="ctr"/>
-          <a:lstStyle/>
-          <a:p>
-            <a:pPr algn="ctr"/>
-            <a:endParaRPr lang="en-US"/>
-          </a:p>
-        </p:txBody>
-      </p:sp>
-    </p:spTree>
-    <p:extLst>
-      <p:ext uri="{BB962C8B-B14F-4D97-AF65-F5344CB8AC3E}">
-        <p14:creationId xmlns:p14="http://schemas.microsoft.com/office/powerpoint/2010/main" val="709894937"/>
       </p:ext>
     </p:extLst>
   </p:cSld>
@@ -8351,6 +9228,237 @@
       </p:grpSpPr>
       <p:sp>
         <p:nvSpPr>
+          <p:cNvPr id="2" name="Title 1"/>
+          <p:cNvSpPr>
+            <a:spLocks noGrp="1"/>
+          </p:cNvSpPr>
+          <p:nvPr>
+            <p:ph type="title"/>
+          </p:nvPr>
+        </p:nvSpPr>
+        <p:spPr/>
+        <p:txBody>
+          <a:bodyPr/>
+          <a:lstStyle/>
+          <a:p>
+            <a:r>
+              <a:rPr lang="en-US" dirty="0" smtClean="0"/>
+              <a:t>Training DBN</a:t>
+            </a:r>
+            <a:endParaRPr lang="en-US" dirty="0"/>
+          </a:p>
+        </p:txBody>
+      </p:sp>
+      <p:sp>
+        <p:nvSpPr>
+          <p:cNvPr id="9" name="Content Placeholder 8"/>
+          <p:cNvSpPr>
+            <a:spLocks noGrp="1"/>
+          </p:cNvSpPr>
+          <p:nvPr>
+            <p:ph sz="half" idx="1"/>
+          </p:nvPr>
+        </p:nvSpPr>
+        <p:spPr/>
+        <p:txBody>
+          <a:bodyPr/>
+          <a:lstStyle/>
+          <a:p>
+            <a:endParaRPr lang="en-US"/>
+          </a:p>
+        </p:txBody>
+      </p:sp>
+      <p:sp>
+        <p:nvSpPr>
+          <p:cNvPr id="10" name="Content Placeholder 9"/>
+          <p:cNvSpPr>
+            <a:spLocks noGrp="1"/>
+          </p:cNvSpPr>
+          <p:nvPr>
+            <p:ph sz="half" idx="2"/>
+          </p:nvPr>
+        </p:nvSpPr>
+        <p:spPr>
+          <a:xfrm>
+            <a:off x="8088630" y="1845735"/>
+            <a:ext cx="3067050" cy="4023360"/>
+          </a:xfrm>
+        </p:spPr>
+        <p:txBody>
+          <a:bodyPr/>
+          <a:lstStyle/>
+          <a:p>
+            <a:r>
+              <a:rPr lang="en-US" dirty="0" smtClean="0"/>
+              <a:t>Step 1: Train one layer at a time using RBM</a:t>
+            </a:r>
+          </a:p>
+          <a:p>
+            <a:r>
+              <a:rPr lang="en-US" dirty="0" smtClean="0"/>
+              <a:t>Step 2: Use weights to initialize the stack</a:t>
+            </a:r>
+          </a:p>
+          <a:p>
+            <a:r>
+              <a:rPr lang="en-US" dirty="0" smtClean="0"/>
+              <a:t>Step 3: Train only upper layer (RBM)</a:t>
+            </a:r>
+          </a:p>
+          <a:p>
+            <a:r>
+              <a:rPr lang="en-US" dirty="0" smtClean="0"/>
+              <a:t>Step 4: Stack up another layer and repeat </a:t>
+            </a:r>
+          </a:p>
+          <a:p>
+            <a:r>
+              <a:rPr lang="en-US" dirty="0" smtClean="0"/>
+              <a:t>Notice that lower level is only a pass-through</a:t>
+            </a:r>
+            <a:endParaRPr lang="en-US" dirty="0"/>
+          </a:p>
+        </p:txBody>
+      </p:sp>
+      <p:sp>
+        <p:nvSpPr>
+          <p:cNvPr id="4" name="TextBox 3"/>
+          <p:cNvSpPr txBox="1"/>
+          <p:nvPr/>
+        </p:nvSpPr>
+        <p:spPr>
+          <a:xfrm>
+            <a:off x="1097280" y="5808190"/>
+            <a:ext cx="8030378" cy="338554"/>
+          </a:xfrm>
+          <a:prstGeom prst="rect">
+            <a:avLst/>
+          </a:prstGeom>
+          <a:noFill/>
+        </p:spPr>
+        <p:txBody>
+          <a:bodyPr wrap="square" rtlCol="0">
+            <a:spAutoFit/>
+          </a:bodyPr>
+          <a:lstStyle/>
+          <a:p>
+            <a:r>
+              <a:rPr lang="en-US" sz="1600" dirty="0" smtClean="0"/>
+              <a:t>Source: http://info.usherbrooke.ca/hlarochelle/neural_networks/content.html</a:t>
+            </a:r>
+            <a:endParaRPr lang="en-US" sz="1600" dirty="0"/>
+          </a:p>
+        </p:txBody>
+      </p:sp>
+      <p:pic>
+        <p:nvPicPr>
+          <p:cNvPr id="6" name="Picture 5"/>
+          <p:cNvPicPr>
+            <a:picLocks noChangeAspect="1"/>
+          </p:cNvPicPr>
+          <p:nvPr/>
+        </p:nvPicPr>
+        <p:blipFill>
+          <a:blip r:embed="rId2">
+            <a:extLst>
+              <a:ext uri="{28A0092B-C50C-407E-A947-70E740481C1C}">
+                <a14:useLocalDpi xmlns:a14="http://schemas.microsoft.com/office/drawing/2010/main" val="0"/>
+              </a:ext>
+            </a:extLst>
+          </a:blip>
+          <a:stretch>
+            <a:fillRect/>
+          </a:stretch>
+        </p:blipFill>
+        <p:spPr>
+          <a:xfrm>
+            <a:off x="1097280" y="1901112"/>
+            <a:ext cx="6991350" cy="3743325"/>
+          </a:xfrm>
+          <a:prstGeom prst="rect">
+            <a:avLst/>
+          </a:prstGeom>
+        </p:spPr>
+      </p:pic>
+      <p:sp>
+        <p:nvSpPr>
+          <p:cNvPr id="8" name="Right Arrow 7"/>
+          <p:cNvSpPr/>
+          <p:nvPr/>
+        </p:nvSpPr>
+        <p:spPr>
+          <a:xfrm>
+            <a:off x="4093524" y="4439798"/>
+            <a:ext cx="705079" cy="462708"/>
+          </a:xfrm>
+          <a:prstGeom prst="rightArrow">
+            <a:avLst/>
+          </a:prstGeom>
+        </p:spPr>
+        <p:style>
+          <a:lnRef idx="2">
+            <a:schemeClr val="accent1">
+              <a:shade val="50000"/>
+            </a:schemeClr>
+          </a:lnRef>
+          <a:fillRef idx="1">
+            <a:schemeClr val="accent1"/>
+          </a:fillRef>
+          <a:effectRef idx="0">
+            <a:schemeClr val="accent1"/>
+          </a:effectRef>
+          <a:fontRef idx="minor">
+            <a:schemeClr val="lt1"/>
+          </a:fontRef>
+        </p:style>
+        <p:txBody>
+          <a:bodyPr rtlCol="0" anchor="ctr"/>
+          <a:lstStyle/>
+          <a:p>
+            <a:pPr algn="ctr"/>
+            <a:endParaRPr lang="en-US"/>
+          </a:p>
+        </p:txBody>
+      </p:sp>
+    </p:spTree>
+    <p:extLst>
+      <p:ext uri="{BB962C8B-B14F-4D97-AF65-F5344CB8AC3E}">
+        <p14:creationId xmlns:p14="http://schemas.microsoft.com/office/powerpoint/2010/main" val="709894937"/>
+      </p:ext>
+    </p:extLst>
+  </p:cSld>
+  <p:clrMapOvr>
+    <a:masterClrMapping/>
+  </p:clrMapOvr>
+  <p:timing>
+    <p:tnLst>
+      <p:par>
+        <p:cTn id="1" dur="indefinite" restart="never" nodeType="tmRoot"/>
+      </p:par>
+    </p:tnLst>
+  </p:timing>
+</p:sld>
+</file>
+
+<file path=ppt/slides/slide8.xml><?xml version="1.0" encoding="utf-8"?>
+<p:sld xmlns:a="http://schemas.openxmlformats.org/drawingml/2006/main" xmlns:r="http://schemas.openxmlformats.org/officeDocument/2006/relationships" xmlns:p="http://schemas.openxmlformats.org/presentationml/2006/main">
+  <p:cSld>
+    <p:spTree>
+      <p:nvGrpSpPr>
+        <p:cNvPr id="1" name=""/>
+        <p:cNvGrpSpPr/>
+        <p:nvPr/>
+      </p:nvGrpSpPr>
+      <p:grpSpPr>
+        <a:xfrm>
+          <a:off x="0" y="0"/>
+          <a:ext cx="0" cy="0"/>
+          <a:chOff x="0" y="0"/>
+          <a:chExt cx="0" cy="0"/>
+        </a:xfrm>
+      </p:grpSpPr>
+      <p:sp>
+        <p:nvSpPr>
           <p:cNvPr id="5" name="Title 4"/>
           <p:cNvSpPr>
             <a:spLocks noGrp="1"/>
@@ -8599,7 +9707,7 @@
           <a:graphicData uri="http://schemas.openxmlformats.org/presentationml/2006/ole">
             <mc:AlternateContent xmlns:mc="http://schemas.openxmlformats.org/markup-compatibility/2006">
               <mc:Choice xmlns:v="urn:schemas-microsoft-com:vml" Requires="v">
-                <p:oleObj spid="_x0000_s1077" name="Equation" r:id="rId3" imgW="507960" imgH="253800" progId="Equation.3">
+                <p:oleObj spid="_x0000_s1085" name="Equation" r:id="rId3" imgW="507960" imgH="253800" progId="Equation.3">
                   <p:embed/>
                 </p:oleObj>
               </mc:Choice>
@@ -8698,7 +9806,7 @@
           <a:graphicData uri="http://schemas.openxmlformats.org/presentationml/2006/ole">
             <mc:AlternateContent xmlns:mc="http://schemas.openxmlformats.org/markup-compatibility/2006">
               <mc:Choice xmlns:v="urn:schemas-microsoft-com:vml" Requires="v">
-                <p:oleObj spid="_x0000_s1078" name="Equation" r:id="rId5" imgW="495000" imgH="253800" progId="Equation.3">
+                <p:oleObj spid="_x0000_s1086" name="Equation" r:id="rId5" imgW="495000" imgH="253800" progId="Equation.3">
                   <p:embed/>
                 </p:oleObj>
               </mc:Choice>
@@ -11812,7 +12920,7 @@
 </p:sld>
 </file>
 
-<file path=ppt/slides/slide8.xml><?xml version="1.0" encoding="utf-8"?>
+<file path=ppt/slides/slide9.xml><?xml version="1.0" encoding="utf-8"?>
 <p:sld xmlns:a="http://schemas.openxmlformats.org/drawingml/2006/main" xmlns:r="http://schemas.openxmlformats.org/officeDocument/2006/relationships" xmlns:p="http://schemas.openxmlformats.org/presentationml/2006/main">
   <p:cSld>
     <p:spTree>
@@ -12498,162 +13606,6 @@
 </p:sld>
 </file>
 
-<file path=ppt/slides/slide9.xml><?xml version="1.0" encoding="utf-8"?>
-<p:sld xmlns:a="http://schemas.openxmlformats.org/drawingml/2006/main" xmlns:r="http://schemas.openxmlformats.org/officeDocument/2006/relationships" xmlns:p="http://schemas.openxmlformats.org/presentationml/2006/main">
-  <p:cSld>
-    <p:spTree>
-      <p:nvGrpSpPr>
-        <p:cNvPr id="1" name=""/>
-        <p:cNvGrpSpPr/>
-        <p:nvPr/>
-      </p:nvGrpSpPr>
-      <p:grpSpPr>
-        <a:xfrm>
-          <a:off x="0" y="0"/>
-          <a:ext cx="0" cy="0"/>
-          <a:chOff x="0" y="0"/>
-          <a:chExt cx="0" cy="0"/>
-        </a:xfrm>
-      </p:grpSpPr>
-      <p:sp>
-        <p:nvSpPr>
-          <p:cNvPr id="2" name="Title 1"/>
-          <p:cNvSpPr>
-            <a:spLocks noGrp="1"/>
-          </p:cNvSpPr>
-          <p:nvPr>
-            <p:ph type="title"/>
-          </p:nvPr>
-        </p:nvSpPr>
-        <p:spPr/>
-        <p:txBody>
-          <a:bodyPr/>
-          <a:lstStyle/>
-          <a:p>
-            <a:r>
-              <a:rPr lang="en-US" dirty="0" smtClean="0"/>
-              <a:t>Empirical Tests (Wikipedia Corpus)</a:t>
-            </a:r>
-            <a:endParaRPr lang="en-US" dirty="0"/>
-          </a:p>
-        </p:txBody>
-      </p:sp>
-      <p:sp>
-        <p:nvSpPr>
-          <p:cNvPr id="7" name="Content Placeholder 6"/>
-          <p:cNvSpPr>
-            <a:spLocks noGrp="1"/>
-          </p:cNvSpPr>
-          <p:nvPr>
-            <p:ph sz="half" idx="1"/>
-          </p:nvPr>
-        </p:nvSpPr>
-        <p:spPr>
-          <a:xfrm>
-            <a:off x="1097278" y="1845734"/>
-            <a:ext cx="3992515" cy="4023360"/>
-          </a:xfrm>
-        </p:spPr>
-        <p:txBody>
-          <a:bodyPr/>
-          <a:lstStyle/>
-          <a:p>
-            <a:r>
-              <a:rPr lang="en-US" dirty="0" smtClean="0"/>
-              <a:t>Classify into 12 categories within Business newsgroup </a:t>
-            </a:r>
-          </a:p>
-          <a:p>
-            <a:r>
-              <a:rPr lang="en-US" dirty="0" smtClean="0"/>
-              <a:t>Labelled data</a:t>
-            </a:r>
-          </a:p>
-          <a:p>
-            <a:pPr lvl="1"/>
-            <a:r>
-              <a:rPr lang="en-US" dirty="0" smtClean="0"/>
-              <a:t>Train/Test = 70/30 </a:t>
-            </a:r>
-          </a:p>
-          <a:p>
-            <a:r>
-              <a:rPr lang="en-US" dirty="0" smtClean="0"/>
-              <a:t>DBN outperforms LDA when measuring % accuracy</a:t>
-            </a:r>
-            <a:endParaRPr lang="en-US" dirty="0"/>
-          </a:p>
-        </p:txBody>
-      </p:sp>
-      <p:sp>
-        <p:nvSpPr>
-          <p:cNvPr id="16" name="Content Placeholder 15"/>
-          <p:cNvSpPr>
-            <a:spLocks noGrp="1"/>
-          </p:cNvSpPr>
-          <p:nvPr>
-            <p:ph sz="half" idx="2"/>
-          </p:nvPr>
-        </p:nvSpPr>
-        <p:spPr/>
-        <p:txBody>
-          <a:bodyPr/>
-          <a:lstStyle/>
-          <a:p>
-            <a:endParaRPr lang="en-US"/>
-          </a:p>
-        </p:txBody>
-      </p:sp>
-      <p:pic>
-        <p:nvPicPr>
-          <p:cNvPr id="10" name="Picture 9"/>
-          <p:cNvPicPr>
-            <a:picLocks noChangeAspect="1"/>
-          </p:cNvPicPr>
-          <p:nvPr/>
-        </p:nvPicPr>
-        <p:blipFill>
-          <a:blip r:embed="rId2">
-            <a:extLst>
-              <a:ext uri="{28A0092B-C50C-407E-A947-70E740481C1C}">
-                <a14:useLocalDpi xmlns:a14="http://schemas.microsoft.com/office/drawing/2010/main" val="0"/>
-              </a:ext>
-            </a:extLst>
-          </a:blip>
-          <a:stretch>
-            <a:fillRect/>
-          </a:stretch>
-        </p:blipFill>
-        <p:spPr>
-          <a:xfrm>
-            <a:off x="5263899" y="1845734"/>
-            <a:ext cx="6516244" cy="2988888"/>
-          </a:xfrm>
-          <a:prstGeom prst="rect">
-            <a:avLst/>
-          </a:prstGeom>
-        </p:spPr>
-      </p:pic>
-    </p:spTree>
-    <p:extLst>
-      <p:ext uri="{BB962C8B-B14F-4D97-AF65-F5344CB8AC3E}">
-        <p14:creationId xmlns:p14="http://schemas.microsoft.com/office/powerpoint/2010/main" val="1249192010"/>
-      </p:ext>
-    </p:extLst>
-  </p:cSld>
-  <p:clrMapOvr>
-    <a:masterClrMapping/>
-  </p:clrMapOvr>
-  <p:timing>
-    <p:tnLst>
-      <p:par>
-        <p:cTn id="1" dur="indefinite" restart="never" nodeType="tmRoot"/>
-      </p:par>
-    </p:tnLst>
-  </p:timing>
-</p:sld>
-</file>
-
 <file path=ppt/theme/theme1.xml><?xml version="1.0" encoding="utf-8"?>
 <a:theme xmlns:a="http://schemas.openxmlformats.org/drawingml/2006/main" name="Retrospect">
   <a:themeElements>
@@ -12935,4 +13887,265 @@
     </a:ext>
   </a:extLst>
 </a:theme>
+</file>
+
+<file path=ppt/theme/theme2.xml><?xml version="1.0" encoding="utf-8"?>
+<a:theme xmlns:a="http://schemas.openxmlformats.org/drawingml/2006/main" name="Office Theme">
+  <a:themeElements>
+    <a:clrScheme name="Office">
+      <a:dk1>
+        <a:sysClr val="windowText" lastClr="000000"/>
+      </a:dk1>
+      <a:lt1>
+        <a:sysClr val="window" lastClr="FFFFFF"/>
+      </a:lt1>
+      <a:dk2>
+        <a:srgbClr val="44546A"/>
+      </a:dk2>
+      <a:lt2>
+        <a:srgbClr val="E7E6E6"/>
+      </a:lt2>
+      <a:accent1>
+        <a:srgbClr val="5B9BD5"/>
+      </a:accent1>
+      <a:accent2>
+        <a:srgbClr val="ED7D31"/>
+      </a:accent2>
+      <a:accent3>
+        <a:srgbClr val="A5A5A5"/>
+      </a:accent3>
+      <a:accent4>
+        <a:srgbClr val="FFC000"/>
+      </a:accent4>
+      <a:accent5>
+        <a:srgbClr val="4472C4"/>
+      </a:accent5>
+      <a:accent6>
+        <a:srgbClr val="70AD47"/>
+      </a:accent6>
+      <a:hlink>
+        <a:srgbClr val="0563C1"/>
+      </a:hlink>
+      <a:folHlink>
+        <a:srgbClr val="954F72"/>
+      </a:folHlink>
+    </a:clrScheme>
+    <a:fontScheme name="Office">
+      <a:majorFont>
+        <a:latin typeface="Calibri Light" panose="020F0302020204030204"/>
+        <a:ea typeface=""/>
+        <a:cs typeface=""/>
+        <a:font script="Jpan" typeface="ＭＳ Ｐゴシック"/>
+        <a:font script="Hang" typeface="맑은 고딕"/>
+        <a:font script="Hans" typeface="宋体"/>
+        <a:font script="Hant" typeface="新細明體"/>
+        <a:font script="Arab" typeface="Times New Roman"/>
+        <a:font script="Hebr" typeface="Times New Roman"/>
+        <a:font script="Thai" typeface="Angsana New"/>
+        <a:font script="Ethi" typeface="Nyala"/>
+        <a:font script="Beng" typeface="Vrinda"/>
+        <a:font script="Gujr" typeface="Shruti"/>
+        <a:font script="Khmr" typeface="MoolBoran"/>
+        <a:font script="Knda" typeface="Tunga"/>
+        <a:font script="Guru" typeface="Raavi"/>
+        <a:font script="Cans" typeface="Euphemia"/>
+        <a:font script="Cher" typeface="Plantagenet Cherokee"/>
+        <a:font script="Yiii" typeface="Microsoft Yi Baiti"/>
+        <a:font script="Tibt" typeface="Microsoft Himalaya"/>
+        <a:font script="Thaa" typeface="MV Boli"/>
+        <a:font script="Deva" typeface="Mangal"/>
+        <a:font script="Telu" typeface="Gautami"/>
+        <a:font script="Taml" typeface="Latha"/>
+        <a:font script="Syrc" typeface="Estrangelo Edessa"/>
+        <a:font script="Orya" typeface="Kalinga"/>
+        <a:font script="Mlym" typeface="Kartika"/>
+        <a:font script="Laoo" typeface="DokChampa"/>
+        <a:font script="Sinh" typeface="Iskoola Pota"/>
+        <a:font script="Mong" typeface="Mongolian Baiti"/>
+        <a:font script="Viet" typeface="Times New Roman"/>
+        <a:font script="Uigh" typeface="Microsoft Uighur"/>
+        <a:font script="Geor" typeface="Sylfaen"/>
+      </a:majorFont>
+      <a:minorFont>
+        <a:latin typeface="Calibri" panose="020F0502020204030204"/>
+        <a:ea typeface=""/>
+        <a:cs typeface=""/>
+        <a:font script="Jpan" typeface="ＭＳ Ｐゴシック"/>
+        <a:font script="Hang" typeface="맑은 고딕"/>
+        <a:font script="Hans" typeface="宋体"/>
+        <a:font script="Hant" typeface="新細明體"/>
+        <a:font script="Arab" typeface="Arial"/>
+        <a:font script="Hebr" typeface="Arial"/>
+        <a:font script="Thai" typeface="Cordia New"/>
+        <a:font script="Ethi" typeface="Nyala"/>
+        <a:font script="Beng" typeface="Vrinda"/>
+        <a:font script="Gujr" typeface="Shruti"/>
+        <a:font script="Khmr" typeface="DaunPenh"/>
+        <a:font script="Knda" typeface="Tunga"/>
+        <a:font script="Guru" typeface="Raavi"/>
+        <a:font script="Cans" typeface="Euphemia"/>
+        <a:font script="Cher" typeface="Plantagenet Cherokee"/>
+        <a:font script="Yiii" typeface="Microsoft Yi Baiti"/>
+        <a:font script="Tibt" typeface="Microsoft Himalaya"/>
+        <a:font script="Thaa" typeface="MV Boli"/>
+        <a:font script="Deva" typeface="Mangal"/>
+        <a:font script="Telu" typeface="Gautami"/>
+        <a:font script="Taml" typeface="Latha"/>
+        <a:font script="Syrc" typeface="Estrangelo Edessa"/>
+        <a:font script="Orya" typeface="Kalinga"/>
+        <a:font script="Mlym" typeface="Kartika"/>
+        <a:font script="Laoo" typeface="DokChampa"/>
+        <a:font script="Sinh" typeface="Iskoola Pota"/>
+        <a:font script="Mong" typeface="Mongolian Baiti"/>
+        <a:font script="Viet" typeface="Arial"/>
+        <a:font script="Uigh" typeface="Microsoft Uighur"/>
+        <a:font script="Geor" typeface="Sylfaen"/>
+      </a:minorFont>
+    </a:fontScheme>
+    <a:fmtScheme name="Office">
+      <a:fillStyleLst>
+        <a:solidFill>
+          <a:schemeClr val="phClr"/>
+        </a:solidFill>
+        <a:gradFill rotWithShape="1">
+          <a:gsLst>
+            <a:gs pos="0">
+              <a:schemeClr val="phClr">
+                <a:lumMod val="110000"/>
+                <a:satMod val="105000"/>
+                <a:tint val="67000"/>
+              </a:schemeClr>
+            </a:gs>
+            <a:gs pos="50000">
+              <a:schemeClr val="phClr">
+                <a:lumMod val="105000"/>
+                <a:satMod val="103000"/>
+                <a:tint val="73000"/>
+              </a:schemeClr>
+            </a:gs>
+            <a:gs pos="100000">
+              <a:schemeClr val="phClr">
+                <a:lumMod val="105000"/>
+                <a:satMod val="109000"/>
+                <a:tint val="81000"/>
+              </a:schemeClr>
+            </a:gs>
+          </a:gsLst>
+          <a:lin ang="5400000" scaled="0"/>
+        </a:gradFill>
+        <a:gradFill rotWithShape="1">
+          <a:gsLst>
+            <a:gs pos="0">
+              <a:schemeClr val="phClr">
+                <a:satMod val="103000"/>
+                <a:lumMod val="102000"/>
+                <a:tint val="94000"/>
+              </a:schemeClr>
+            </a:gs>
+            <a:gs pos="50000">
+              <a:schemeClr val="phClr">
+                <a:satMod val="110000"/>
+                <a:lumMod val="100000"/>
+                <a:shade val="100000"/>
+              </a:schemeClr>
+            </a:gs>
+            <a:gs pos="100000">
+              <a:schemeClr val="phClr">
+                <a:lumMod val="99000"/>
+                <a:satMod val="120000"/>
+                <a:shade val="78000"/>
+              </a:schemeClr>
+            </a:gs>
+          </a:gsLst>
+          <a:lin ang="5400000" scaled="0"/>
+        </a:gradFill>
+      </a:fillStyleLst>
+      <a:lnStyleLst>
+        <a:ln w="6350" cap="flat" cmpd="sng" algn="ctr">
+          <a:solidFill>
+            <a:schemeClr val="phClr"/>
+          </a:solidFill>
+          <a:prstDash val="solid"/>
+          <a:miter lim="800000"/>
+        </a:ln>
+        <a:ln w="12700" cap="flat" cmpd="sng" algn="ctr">
+          <a:solidFill>
+            <a:schemeClr val="phClr"/>
+          </a:solidFill>
+          <a:prstDash val="solid"/>
+          <a:miter lim="800000"/>
+        </a:ln>
+        <a:ln w="19050" cap="flat" cmpd="sng" algn="ctr">
+          <a:solidFill>
+            <a:schemeClr val="phClr"/>
+          </a:solidFill>
+          <a:prstDash val="solid"/>
+          <a:miter lim="800000"/>
+        </a:ln>
+      </a:lnStyleLst>
+      <a:effectStyleLst>
+        <a:effectStyle>
+          <a:effectLst/>
+        </a:effectStyle>
+        <a:effectStyle>
+          <a:effectLst/>
+        </a:effectStyle>
+        <a:effectStyle>
+          <a:effectLst>
+            <a:outerShdw blurRad="57150" dist="19050" dir="5400000" algn="ctr" rotWithShape="0">
+              <a:srgbClr val="000000">
+                <a:alpha val="63000"/>
+              </a:srgbClr>
+            </a:outerShdw>
+          </a:effectLst>
+        </a:effectStyle>
+      </a:effectStyleLst>
+      <a:bgFillStyleLst>
+        <a:solidFill>
+          <a:schemeClr val="phClr"/>
+        </a:solidFill>
+        <a:solidFill>
+          <a:schemeClr val="phClr">
+            <a:tint val="95000"/>
+            <a:satMod val="170000"/>
+          </a:schemeClr>
+        </a:solidFill>
+        <a:gradFill rotWithShape="1">
+          <a:gsLst>
+            <a:gs pos="0">
+              <a:schemeClr val="phClr">
+                <a:tint val="93000"/>
+                <a:satMod val="150000"/>
+                <a:shade val="98000"/>
+                <a:lumMod val="102000"/>
+              </a:schemeClr>
+            </a:gs>
+            <a:gs pos="50000">
+              <a:schemeClr val="phClr">
+                <a:tint val="98000"/>
+                <a:satMod val="130000"/>
+                <a:shade val="90000"/>
+                <a:lumMod val="103000"/>
+              </a:schemeClr>
+            </a:gs>
+            <a:gs pos="100000">
+              <a:schemeClr val="phClr">
+                <a:shade val="63000"/>
+                <a:satMod val="120000"/>
+              </a:schemeClr>
+            </a:gs>
+          </a:gsLst>
+          <a:lin ang="5400000" scaled="0"/>
+        </a:gradFill>
+      </a:bgFillStyleLst>
+    </a:fmtScheme>
+  </a:themeElements>
+  <a:objectDefaults/>
+  <a:extraClrSchemeLst/>
+  <a:extLst>
+    <a:ext uri="{05A4C25C-085E-4340-85A3-A5531E510DB2}">
+      <thm15:themeFamily xmlns:thm15="http://schemas.microsoft.com/office/thememl/2012/main" name="Office Theme" id="{62F939B6-93AF-4DB8-9C6B-D6C7DFDC589F}" vid="{4A3C46E8-61CC-4603-A589-7422A47A8E4A}"/>
+    </a:ext>
+  </a:extLst>
+</a:theme>
 </file>
</xml_diff>

<commit_message>
typed the formula of generative model of LDA in slide
</commit_message>
<xml_diff>
--- a/HW4/DBN-v2.pptx
+++ b/HW4/DBN-v2.pptx
@@ -173,7 +173,6 @@
           </a:p>
         </c:rich>
       </c:tx>
-      <c:layout/>
       <c:overlay val="0"/>
       <c:spPr>
         <a:noFill/>
@@ -428,11 +427,11 @@
           <c:showBubbleSize val="0"/>
         </c:dLbls>
         <c:smooth val="0"/>
-        <c:axId val="240396960"/>
-        <c:axId val="240396176"/>
+        <c:axId val="345804184"/>
+        <c:axId val="345804968"/>
       </c:lineChart>
       <c:catAx>
-        <c:axId val="240396960"/>
+        <c:axId val="345804184"/>
         <c:scaling>
           <c:orientation val="minMax"/>
         </c:scaling>
@@ -465,7 +464,6 @@
               </a:p>
             </c:rich>
           </c:tx>
-          <c:layout/>
           <c:overlay val="0"/>
           <c:spPr>
             <a:noFill/>
@@ -532,7 +530,7 @@
             <a:endParaRPr lang="en-US"/>
           </a:p>
         </c:txPr>
-        <c:crossAx val="240396176"/>
+        <c:crossAx val="345804968"/>
         <c:crosses val="autoZero"/>
         <c:auto val="1"/>
         <c:lblAlgn val="ctr"/>
@@ -540,7 +538,7 @@
         <c:noMultiLvlLbl val="0"/>
       </c:catAx>
       <c:valAx>
-        <c:axId val="240396176"/>
+        <c:axId val="345804968"/>
         <c:scaling>
           <c:orientation val="minMax"/>
         </c:scaling>
@@ -591,7 +589,6 @@
               </a:p>
             </c:rich>
           </c:tx>
-          <c:layout/>
           <c:overlay val="0"/>
           <c:spPr>
             <a:noFill/>
@@ -652,7 +649,7 @@
             <a:endParaRPr lang="en-US"/>
           </a:p>
         </c:txPr>
-        <c:crossAx val="240396960"/>
+        <c:crossAx val="345804184"/>
         <c:crosses val="autoZero"/>
         <c:crossBetween val="between"/>
       </c:valAx>
@@ -674,7 +671,6 @@
         <c:idx val="2"/>
         <c:delete val="1"/>
       </c:legendEntry>
-      <c:layout/>
       <c:overlay val="0"/>
       <c:spPr>
         <a:noFill/>
@@ -776,7 +772,6 @@
           </a:p>
         </c:rich>
       </c:tx>
-      <c:layout/>
       <c:overlay val="0"/>
       <c:spPr>
         <a:noFill/>
@@ -1067,11 +1062,11 @@
           <c:showBubbleSize val="0"/>
         </c:dLbls>
         <c:smooth val="0"/>
-        <c:axId val="317059520"/>
-        <c:axId val="317062656"/>
+        <c:axId val="345800656"/>
+        <c:axId val="345801048"/>
       </c:lineChart>
       <c:catAx>
-        <c:axId val="317059520"/>
+        <c:axId val="345800656"/>
         <c:scaling>
           <c:orientation val="minMax"/>
         </c:scaling>
@@ -1104,7 +1099,6 @@
               </a:p>
             </c:rich>
           </c:tx>
-          <c:layout/>
           <c:overlay val="0"/>
           <c:spPr>
             <a:noFill/>
@@ -1171,7 +1165,7 @@
             <a:endParaRPr lang="en-US"/>
           </a:p>
         </c:txPr>
-        <c:crossAx val="317062656"/>
+        <c:crossAx val="345801048"/>
         <c:crosses val="autoZero"/>
         <c:auto val="1"/>
         <c:lblAlgn val="ctr"/>
@@ -1179,7 +1173,7 @@
         <c:noMultiLvlLbl val="0"/>
       </c:catAx>
       <c:valAx>
-        <c:axId val="317062656"/>
+        <c:axId val="345801048"/>
         <c:scaling>
           <c:orientation val="minMax"/>
         </c:scaling>
@@ -1230,7 +1224,6 @@
               </a:p>
             </c:rich>
           </c:tx>
-          <c:layout/>
           <c:overlay val="0"/>
           <c:spPr>
             <a:noFill/>
@@ -1291,7 +1284,7 @@
             <a:endParaRPr lang="en-US"/>
           </a:p>
         </c:txPr>
-        <c:crossAx val="317059520"/>
+        <c:crossAx val="345800656"/>
         <c:crosses val="autoZero"/>
         <c:crossBetween val="between"/>
       </c:valAx>
@@ -1305,7 +1298,6 @@
     </c:plotArea>
     <c:legend>
       <c:legendPos val="b"/>
-      <c:layout/>
       <c:overlay val="0"/>
       <c:spPr>
         <a:noFill/>
@@ -3110,6 +3102,90 @@
 </p:notes>
 </file>
 
+<file path=ppt/notesSlides/notesSlide3.xml><?xml version="1.0" encoding="utf-8"?>
+<p:notes xmlns:a="http://schemas.openxmlformats.org/drawingml/2006/main" xmlns:r="http://schemas.openxmlformats.org/officeDocument/2006/relationships" xmlns:p="http://schemas.openxmlformats.org/presentationml/2006/main">
+  <p:cSld>
+    <p:spTree>
+      <p:nvGrpSpPr>
+        <p:cNvPr id="1" name=""/>
+        <p:cNvGrpSpPr/>
+        <p:nvPr/>
+      </p:nvGrpSpPr>
+      <p:grpSpPr>
+        <a:xfrm>
+          <a:off x="0" y="0"/>
+          <a:ext cx="0" cy="0"/>
+          <a:chOff x="0" y="0"/>
+          <a:chExt cx="0" cy="0"/>
+        </a:xfrm>
+      </p:grpSpPr>
+      <p:sp>
+        <p:nvSpPr>
+          <p:cNvPr id="2" name="Slide Image Placeholder 1"/>
+          <p:cNvSpPr>
+            <a:spLocks noGrp="1" noRot="1" noChangeAspect="1"/>
+          </p:cNvSpPr>
+          <p:nvPr>
+            <p:ph type="sldImg"/>
+          </p:nvPr>
+        </p:nvSpPr>
+        <p:spPr/>
+      </p:sp>
+      <p:sp>
+        <p:nvSpPr>
+          <p:cNvPr id="3" name="Notes Placeholder 2"/>
+          <p:cNvSpPr>
+            <a:spLocks noGrp="1"/>
+          </p:cNvSpPr>
+          <p:nvPr>
+            <p:ph type="body" idx="1"/>
+          </p:nvPr>
+        </p:nvSpPr>
+        <p:spPr/>
+        <p:txBody>
+          <a:bodyPr/>
+          <a:lstStyle/>
+          <a:p>
+            <a:endParaRPr lang="en-US"/>
+          </a:p>
+        </p:txBody>
+      </p:sp>
+      <p:sp>
+        <p:nvSpPr>
+          <p:cNvPr id="4" name="Slide Number Placeholder 3"/>
+          <p:cNvSpPr>
+            <a:spLocks noGrp="1"/>
+          </p:cNvSpPr>
+          <p:nvPr>
+            <p:ph type="sldNum" sz="quarter" idx="10"/>
+          </p:nvPr>
+        </p:nvSpPr>
+        <p:spPr/>
+        <p:txBody>
+          <a:bodyPr/>
+          <a:lstStyle/>
+          <a:p>
+            <a:fld id="{CA184533-7BC9-4CE8-BD5E-7F40AAB3FD78}" type="slidenum">
+              <a:rPr lang="en-US" smtClean="0"/>
+              <a:t>4</a:t>
+            </a:fld>
+            <a:endParaRPr lang="en-US"/>
+          </a:p>
+        </p:txBody>
+      </p:sp>
+    </p:spTree>
+    <p:extLst>
+      <p:ext uri="{BB962C8B-B14F-4D97-AF65-F5344CB8AC3E}">
+        <p14:creationId xmlns:p14="http://schemas.microsoft.com/office/powerpoint/2010/main" val="2658593293"/>
+      </p:ext>
+    </p:extLst>
+  </p:cSld>
+  <p:clrMapOvr>
+    <a:masterClrMapping/>
+  </p:clrMapOvr>
+</p:notes>
+</file>
+
 <file path=ppt/slideLayouts/slideLayout1.xml><?xml version="1.0" encoding="utf-8"?>
 <p:sldLayout xmlns:a="http://schemas.openxmlformats.org/drawingml/2006/main" xmlns:r="http://schemas.openxmlformats.org/officeDocument/2006/relationships" xmlns:p="http://schemas.openxmlformats.org/presentationml/2006/main" showMasterSp="0" type="title" preserve="1">
   <p:cSld name="Title Slide">
@@ -7756,7 +7832,6 @@
               <a:rPr lang="en-US" sz="1600" dirty="0"/>
               <a:t>https://www.cs.princeton.edu/~blei/papers/Blei2012.pdf</a:t>
             </a:r>
-            <a:endParaRPr lang="en-US" sz="1600" dirty="0"/>
           </a:p>
         </p:txBody>
       </p:sp>
@@ -7836,7 +7911,7 @@
           </p:nvPr>
         </p:nvPicPr>
         <p:blipFill>
-          <a:blip r:embed="rId2"/>
+          <a:blip r:embed="rId3"/>
           <a:stretch>
             <a:fillRect/>
           </a:stretch>
@@ -7853,353 +7928,28 @@
       </p:pic>
       <p:pic>
         <p:nvPicPr>
-          <p:cNvPr id="5" name="Picture 4"/>
+          <p:cNvPr id="7" name="Picture 6"/>
           <p:cNvPicPr>
             <a:picLocks noChangeAspect="1"/>
           </p:cNvPicPr>
           <p:nvPr/>
         </p:nvPicPr>
         <p:blipFill>
-          <a:blip r:embed="rId3"/>
+          <a:blip r:embed="rId4"/>
           <a:stretch>
             <a:fillRect/>
           </a:stretch>
         </p:blipFill>
         <p:spPr>
           <a:xfrm>
-            <a:off x="918154" y="4432515"/>
-            <a:ext cx="3008462" cy="1851565"/>
+            <a:off x="2977686" y="4593332"/>
+            <a:ext cx="5419725" cy="838200"/>
           </a:xfrm>
           <a:prstGeom prst="rect">
             <a:avLst/>
           </a:prstGeom>
         </p:spPr>
       </p:pic>
-      <mc:AlternateContent xmlns:mc="http://schemas.openxmlformats.org/markup-compatibility/2006">
-        <mc:Choice xmlns:a14="http://schemas.microsoft.com/office/drawing/2010/main" Requires="a14">
-          <p:sp>
-            <p:nvSpPr>
-              <p:cNvPr id="6" name="Rectangle 5"/>
-              <p:cNvSpPr/>
-              <p:nvPr/>
-            </p:nvSpPr>
-            <p:spPr>
-              <a:xfrm>
-                <a:off x="3858872" y="4432515"/>
-                <a:ext cx="4535216" cy="506870"/>
-              </a:xfrm>
-              <a:prstGeom prst="rect">
-                <a:avLst/>
-              </a:prstGeom>
-            </p:spPr>
-            <p:txBody>
-              <a:bodyPr wrap="none">
-                <a:spAutoFit/>
-              </a:bodyPr>
-              <a:lstStyle/>
-              <a:p>
-                <a14:m>
-                  <m:oMathPara xmlns:m="http://schemas.openxmlformats.org/officeDocument/2006/math">
-                    <m:oMathParaPr>
-                      <m:jc m:val="centerGroup"/>
-                    </m:oMathParaPr>
-                    <m:oMath xmlns:m="http://schemas.openxmlformats.org/officeDocument/2006/math">
-                      <m:r>
-                        <a:rPr lang="en-US" i="1">
-                          <a:latin typeface="Cambria Math" panose="02040503050406030204" pitchFamily="18" charset="0"/>
-                        </a:rPr>
-                        <m:t>𝑝</m:t>
-                      </m:r>
-                      <m:d>
-                        <m:dPr>
-                          <m:ctrlPr>
-                            <a:rPr lang="en-US" i="1">
-                              <a:latin typeface="Cambria Math" panose="02040503050406030204" pitchFamily="18" charset="0"/>
-                            </a:rPr>
-                          </m:ctrlPr>
-                        </m:dPr>
-                        <m:e>
-                          <m:sSubSup>
-                            <m:sSubSupPr>
-                              <m:ctrlPr>
-                                <a:rPr lang="en-US" i="1">
-                                  <a:latin typeface="Cambria Math" panose="02040503050406030204" pitchFamily="18" charset="0"/>
-                                </a:rPr>
-                              </m:ctrlPr>
-                            </m:sSubSupPr>
-                            <m:e>
-                              <m:r>
-                                <a:rPr lang="en-US" i="1">
-                                  <a:latin typeface="Cambria Math" panose="02040503050406030204" pitchFamily="18" charset="0"/>
-                                </a:rPr>
-                                <m:t>h</m:t>
-                              </m:r>
-                            </m:e>
-                            <m:sub>
-                              <m:r>
-                                <a:rPr lang="en-US" i="1">
-                                  <a:latin typeface="Cambria Math" panose="02040503050406030204" pitchFamily="18" charset="0"/>
-                                </a:rPr>
-                                <m:t>𝑗</m:t>
-                              </m:r>
-                            </m:sub>
-                            <m:sup>
-                              <m:d>
-                                <m:dPr>
-                                  <m:ctrlPr>
-                                    <a:rPr lang="en-US" i="1">
-                                      <a:latin typeface="Cambria Math" panose="02040503050406030204" pitchFamily="18" charset="0"/>
-                                    </a:rPr>
-                                  </m:ctrlPr>
-                                </m:dPr>
-                                <m:e>
-                                  <m:r>
-                                    <a:rPr lang="en-US" i="1">
-                                      <a:latin typeface="Cambria Math" panose="02040503050406030204" pitchFamily="18" charset="0"/>
-                                    </a:rPr>
-                                    <m:t>1</m:t>
-                                  </m:r>
-                                </m:e>
-                              </m:d>
-                            </m:sup>
-                          </m:sSubSup>
-                          <m:r>
-                            <a:rPr lang="en-US" i="1">
-                              <a:latin typeface="Cambria Math" panose="02040503050406030204" pitchFamily="18" charset="0"/>
-                            </a:rPr>
-                            <m:t>=1</m:t>
-                          </m:r>
-                        </m:e>
-                        <m:e>
-                          <m:sSup>
-                            <m:sSupPr>
-                              <m:ctrlPr>
-                                <a:rPr lang="en-US" i="1">
-                                  <a:latin typeface="Cambria Math" panose="02040503050406030204" pitchFamily="18" charset="0"/>
-                                </a:rPr>
-                              </m:ctrlPr>
-                            </m:sSupPr>
-                            <m:e>
-                              <m:r>
-                                <a:rPr lang="en-US" i="1">
-                                  <a:latin typeface="Cambria Math" panose="02040503050406030204" pitchFamily="18" charset="0"/>
-                                </a:rPr>
-                                <m:t>h</m:t>
-                              </m:r>
-                            </m:e>
-                            <m:sup>
-                              <m:d>
-                                <m:dPr>
-                                  <m:ctrlPr>
-                                    <a:rPr lang="en-US" i="1">
-                                      <a:latin typeface="Cambria Math" panose="02040503050406030204" pitchFamily="18" charset="0"/>
-                                    </a:rPr>
-                                  </m:ctrlPr>
-                                </m:dPr>
-                                <m:e>
-                                  <m:r>
-                                    <a:rPr lang="en-US" i="1">
-                                      <a:latin typeface="Cambria Math" panose="02040503050406030204" pitchFamily="18" charset="0"/>
-                                    </a:rPr>
-                                    <m:t>2</m:t>
-                                  </m:r>
-                                </m:e>
-                              </m:d>
-                            </m:sup>
-                          </m:sSup>
-                        </m:e>
-                      </m:d>
-                      <m:r>
-                        <a:rPr lang="en-US" i="1">
-                          <a:latin typeface="Cambria Math" panose="02040503050406030204" pitchFamily="18" charset="0"/>
-                        </a:rPr>
-                        <m:t>=</m:t>
-                      </m:r>
-                      <m:r>
-                        <a:rPr lang="en-US" i="1">
-                          <a:latin typeface="Cambria Math" panose="02040503050406030204" pitchFamily="18" charset="0"/>
-                        </a:rPr>
-                        <m:t>𝑠𝑖𝑔𝑚</m:t>
-                      </m:r>
-                      <m:r>
-                        <a:rPr lang="en-US" i="1">
-                          <a:latin typeface="Cambria Math" panose="02040503050406030204" pitchFamily="18" charset="0"/>
-                        </a:rPr>
-                        <m:t>(</m:t>
-                      </m:r>
-                      <m:sSup>
-                        <m:sSupPr>
-                          <m:ctrlPr>
-                            <a:rPr lang="en-US" i="1">
-                              <a:latin typeface="Cambria Math" panose="02040503050406030204" pitchFamily="18" charset="0"/>
-                            </a:rPr>
-                          </m:ctrlPr>
-                        </m:sSupPr>
-                        <m:e>
-                          <m:r>
-                            <a:rPr lang="en-US" i="1">
-                              <a:latin typeface="Cambria Math" panose="02040503050406030204" pitchFamily="18" charset="0"/>
-                            </a:rPr>
-                            <m:t>𝑏</m:t>
-                          </m:r>
-                        </m:e>
-                        <m:sup>
-                          <m:d>
-                            <m:dPr>
-                              <m:ctrlPr>
-                                <a:rPr lang="en-US" i="1">
-                                  <a:latin typeface="Cambria Math" panose="02040503050406030204" pitchFamily="18" charset="0"/>
-                                </a:rPr>
-                              </m:ctrlPr>
-                            </m:dPr>
-                            <m:e>
-                              <m:r>
-                                <a:rPr lang="en-US" i="1">
-                                  <a:latin typeface="Cambria Math" panose="02040503050406030204" pitchFamily="18" charset="0"/>
-                                </a:rPr>
-                                <m:t>1</m:t>
-                              </m:r>
-                            </m:e>
-                          </m:d>
-                        </m:sup>
-                      </m:sSup>
-                      <m:r>
-                        <a:rPr lang="en-US" i="1">
-                          <a:latin typeface="Cambria Math" panose="02040503050406030204" pitchFamily="18" charset="0"/>
-                        </a:rPr>
-                        <m:t>+</m:t>
-                      </m:r>
-                      <m:sSup>
-                        <m:sSupPr>
-                          <m:ctrlPr>
-                            <a:rPr lang="en-US" i="1">
-                              <a:latin typeface="Cambria Math" panose="02040503050406030204" pitchFamily="18" charset="0"/>
-                            </a:rPr>
-                          </m:ctrlPr>
-                        </m:sSupPr>
-                        <m:e>
-                          <m:r>
-                            <a:rPr lang="en-US" i="1">
-                              <a:latin typeface="Cambria Math" panose="02040503050406030204" pitchFamily="18" charset="0"/>
-                            </a:rPr>
-                            <m:t>𝑊</m:t>
-                          </m:r>
-                        </m:e>
-                        <m:sup>
-                          <m:d>
-                            <m:dPr>
-                              <m:ctrlPr>
-                                <a:rPr lang="en-US" i="1">
-                                  <a:latin typeface="Cambria Math" panose="02040503050406030204" pitchFamily="18" charset="0"/>
-                                </a:rPr>
-                              </m:ctrlPr>
-                            </m:dPr>
-                            <m:e>
-                              <m:r>
-                                <a:rPr lang="en-US" i="1">
-                                  <a:latin typeface="Cambria Math" panose="02040503050406030204" pitchFamily="18" charset="0"/>
-                                </a:rPr>
-                                <m:t>2</m:t>
-                              </m:r>
-                            </m:e>
-                          </m:d>
-                          <m:r>
-                            <a:rPr lang="en-US" i="1">
-                              <a:latin typeface="Cambria Math" panose="02040503050406030204" pitchFamily="18" charset="0"/>
-                            </a:rPr>
-                            <m:t>𝑇</m:t>
-                          </m:r>
-                        </m:sup>
-                      </m:sSup>
-                      <m:sSup>
-                        <m:sSupPr>
-                          <m:ctrlPr>
-                            <a:rPr lang="en-US" i="1">
-                              <a:latin typeface="Cambria Math" panose="02040503050406030204" pitchFamily="18" charset="0"/>
-                            </a:rPr>
-                          </m:ctrlPr>
-                        </m:sSupPr>
-                        <m:e>
-                          <m:r>
-                            <a:rPr lang="en-US" i="1">
-                              <a:latin typeface="Cambria Math" panose="02040503050406030204" pitchFamily="18" charset="0"/>
-                            </a:rPr>
-                            <m:t>h</m:t>
-                          </m:r>
-                        </m:e>
-                        <m:sup>
-                          <m:d>
-                            <m:dPr>
-                              <m:ctrlPr>
-                                <a:rPr lang="en-US" i="1">
-                                  <a:latin typeface="Cambria Math" panose="02040503050406030204" pitchFamily="18" charset="0"/>
-                                </a:rPr>
-                              </m:ctrlPr>
-                            </m:dPr>
-                            <m:e>
-                              <m:r>
-                                <a:rPr lang="en-US" i="1">
-                                  <a:latin typeface="Cambria Math" panose="02040503050406030204" pitchFamily="18" charset="0"/>
-                                </a:rPr>
-                                <m:t>2</m:t>
-                              </m:r>
-                            </m:e>
-                          </m:d>
-                        </m:sup>
-                      </m:sSup>
-                      <m:r>
-                        <a:rPr lang="en-US" i="1">
-                          <a:latin typeface="Cambria Math" panose="02040503050406030204" pitchFamily="18" charset="0"/>
-                        </a:rPr>
-                        <m:t>)</m:t>
-                      </m:r>
-                    </m:oMath>
-                  </m:oMathPara>
-                </a14:m>
-                <a:endParaRPr lang="en-US" dirty="0"/>
-              </a:p>
-            </p:txBody>
-          </p:sp>
-        </mc:Choice>
-        <mc:Fallback>
-          <p:sp>
-            <p:nvSpPr>
-              <p:cNvPr id="6" name="Rectangle 5"/>
-              <p:cNvSpPr>
-                <a:spLocks noRot="1" noChangeAspect="1" noMove="1" noResize="1" noEditPoints="1" noAdjustHandles="1" noChangeArrowheads="1" noChangeShapeType="1" noTextEdit="1"/>
-              </p:cNvSpPr>
-              <p:nvPr/>
-            </p:nvSpPr>
-            <p:spPr>
-              <a:xfrm>
-                <a:off x="3858872" y="4432515"/>
-                <a:ext cx="4535216" cy="506870"/>
-              </a:xfrm>
-              <a:prstGeom prst="rect">
-                <a:avLst/>
-              </a:prstGeom>
-              <a:blipFill rotWithShape="0">
-                <a:blip r:embed="rId4"/>
-                <a:stretch>
-                  <a:fillRect b="-2410"/>
-                </a:stretch>
-              </a:blipFill>
-            </p:spPr>
-            <p:txBody>
-              <a:bodyPr/>
-              <a:lstStyle/>
-              <a:p>
-                <a:r>
-                  <a:rPr lang="en-US">
-                    <a:noFill/>
-                  </a:rPr>
-                  <a:t> </a:t>
-                </a:r>
-              </a:p>
-            </p:txBody>
-          </p:sp>
-        </mc:Fallback>
-      </mc:AlternateContent>
     </p:spTree>
     <p:extLst>
       <p:ext uri="{BB962C8B-B14F-4D97-AF65-F5344CB8AC3E}">
@@ -9707,7 +9457,7 @@
           <a:graphicData uri="http://schemas.openxmlformats.org/presentationml/2006/ole">
             <mc:AlternateContent xmlns:mc="http://schemas.openxmlformats.org/markup-compatibility/2006">
               <mc:Choice xmlns:v="urn:schemas-microsoft-com:vml" Requires="v">
-                <p:oleObj spid="_x0000_s1085" name="Equation" r:id="rId3" imgW="507960" imgH="253800" progId="Equation.3">
+                <p:oleObj spid="_x0000_s1089" name="Equation" r:id="rId3" imgW="507960" imgH="253800" progId="Equation.3">
                   <p:embed/>
                 </p:oleObj>
               </mc:Choice>
@@ -9806,7 +9556,7 @@
           <a:graphicData uri="http://schemas.openxmlformats.org/presentationml/2006/ole">
             <mc:AlternateContent xmlns:mc="http://schemas.openxmlformats.org/markup-compatibility/2006">
               <mc:Choice xmlns:v="urn:schemas-microsoft-com:vml" Requires="v">
-                <p:oleObj spid="_x0000_s1086" name="Equation" r:id="rId5" imgW="495000" imgH="253800" progId="Equation.3">
+                <p:oleObj spid="_x0000_s1090" name="Equation" r:id="rId5" imgW="495000" imgH="253800" progId="Equation.3">
                   <p:embed/>
                 </p:oleObj>
               </mc:Choice>

</xml_diff>